<commit_message>
[master] added lesson 8.
</commit_message>
<xml_diff>
--- a/lab_03-dart_101_part_2/lab_03-dart_101_part_2.pptx
+++ b/lab_03-dart_101_part_2/lab_03-dart_101_part_2.pptx
@@ -9,8 +9,8 @@
   </p:notesMasterIdLst>
   <p:sldIdLst>
     <p:sldId id="259" r:id="rId2"/>
-    <p:sldId id="282" r:id="rId3"/>
-    <p:sldId id="380" r:id="rId4"/>
+    <p:sldId id="380" r:id="rId3"/>
+    <p:sldId id="369" r:id="rId4"/>
     <p:sldId id="288" r:id="rId5"/>
     <p:sldId id="381" r:id="rId6"/>
     <p:sldId id="304" r:id="rId7"/>
@@ -233,7 +233,7 @@
           <a:p>
             <a:fld id="{81C4B3FE-0320-8142-8396-5C3025C019EC}" type="datetimeFigureOut">
               <a:rPr lang="en-IT" smtClean="0"/>
-              <a:t>08/01/22</a:t>
+              <a:t>24/02/22</a:t>
             </a:fld>
             <a:endParaRPr lang="en-IT"/>
           </a:p>
@@ -650,7 +650,7 @@
           <a:p>
             <a:fld id="{CC0F43FB-3F33-3F4B-9768-2FBED988F992}" type="slidenum">
               <a:rPr lang="en-IT" smtClean="0"/>
-              <a:t>13</a:t>
+              <a:t>12</a:t>
             </a:fld>
             <a:endParaRPr lang="en-IT"/>
           </a:p>
@@ -659,7 +659,7 @@
     </p:spTree>
     <p:extLst>
       <p:ext uri="{BB962C8B-B14F-4D97-AF65-F5344CB8AC3E}">
-        <p14:creationId xmlns:p14="http://schemas.microsoft.com/office/powerpoint/2010/main" val="1287003492"/>
+        <p14:creationId xmlns:p14="http://schemas.microsoft.com/office/powerpoint/2010/main" val="3798116206"/>
       </p:ext>
     </p:extLst>
   </p:cSld>
@@ -734,7 +734,7 @@
           <a:p>
             <a:fld id="{CC0F43FB-3F33-3F4B-9768-2FBED988F992}" type="slidenum">
               <a:rPr lang="en-IT" smtClean="0"/>
-              <a:t>15</a:t>
+              <a:t>13</a:t>
             </a:fld>
             <a:endParaRPr lang="en-IT"/>
           </a:p>
@@ -743,7 +743,7 @@
     </p:spTree>
     <p:extLst>
       <p:ext uri="{BB962C8B-B14F-4D97-AF65-F5344CB8AC3E}">
-        <p14:creationId xmlns:p14="http://schemas.microsoft.com/office/powerpoint/2010/main" val="130432656"/>
+        <p14:creationId xmlns:p14="http://schemas.microsoft.com/office/powerpoint/2010/main" val="1287003492"/>
       </p:ext>
     </p:extLst>
   </p:cSld>
@@ -818,7 +818,7 @@
           <a:p>
             <a:fld id="{CC0F43FB-3F33-3F4B-9768-2FBED988F992}" type="slidenum">
               <a:rPr lang="en-IT" smtClean="0"/>
-              <a:t>16</a:t>
+              <a:t>15</a:t>
             </a:fld>
             <a:endParaRPr lang="en-IT"/>
           </a:p>
@@ -827,7 +827,7 @@
     </p:spTree>
     <p:extLst>
       <p:ext uri="{BB962C8B-B14F-4D97-AF65-F5344CB8AC3E}">
-        <p14:creationId xmlns:p14="http://schemas.microsoft.com/office/powerpoint/2010/main" val="1267694875"/>
+        <p14:creationId xmlns:p14="http://schemas.microsoft.com/office/powerpoint/2010/main" val="130432656"/>
       </p:ext>
     </p:extLst>
   </p:cSld>
@@ -902,7 +902,7 @@
           <a:p>
             <a:fld id="{CC0F43FB-3F33-3F4B-9768-2FBED988F992}" type="slidenum">
               <a:rPr lang="en-IT" smtClean="0"/>
-              <a:t>17</a:t>
+              <a:t>16</a:t>
             </a:fld>
             <a:endParaRPr lang="en-IT"/>
           </a:p>
@@ -911,7 +911,7 @@
     </p:spTree>
     <p:extLst>
       <p:ext uri="{BB962C8B-B14F-4D97-AF65-F5344CB8AC3E}">
-        <p14:creationId xmlns:p14="http://schemas.microsoft.com/office/powerpoint/2010/main" val="1600952910"/>
+        <p14:creationId xmlns:p14="http://schemas.microsoft.com/office/powerpoint/2010/main" val="1267694875"/>
       </p:ext>
     </p:extLst>
   </p:cSld>
@@ -986,7 +986,7 @@
           <a:p>
             <a:fld id="{CC0F43FB-3F33-3F4B-9768-2FBED988F992}" type="slidenum">
               <a:rPr lang="en-IT" smtClean="0"/>
-              <a:t>18</a:t>
+              <a:t>17</a:t>
             </a:fld>
             <a:endParaRPr lang="en-IT"/>
           </a:p>
@@ -995,7 +995,7 @@
     </p:spTree>
     <p:extLst>
       <p:ext uri="{BB962C8B-B14F-4D97-AF65-F5344CB8AC3E}">
-        <p14:creationId xmlns:p14="http://schemas.microsoft.com/office/powerpoint/2010/main" val="2932656494"/>
+        <p14:creationId xmlns:p14="http://schemas.microsoft.com/office/powerpoint/2010/main" val="1600952910"/>
       </p:ext>
     </p:extLst>
   </p:cSld>
@@ -1070,7 +1070,7 @@
           <a:p>
             <a:fld id="{CC0F43FB-3F33-3F4B-9768-2FBED988F992}" type="slidenum">
               <a:rPr lang="en-IT" smtClean="0"/>
-              <a:t>19</a:t>
+              <a:t>18</a:t>
             </a:fld>
             <a:endParaRPr lang="en-IT"/>
           </a:p>
@@ -1079,7 +1079,7 @@
     </p:spTree>
     <p:extLst>
       <p:ext uri="{BB962C8B-B14F-4D97-AF65-F5344CB8AC3E}">
-        <p14:creationId xmlns:p14="http://schemas.microsoft.com/office/powerpoint/2010/main" val="361118316"/>
+        <p14:creationId xmlns:p14="http://schemas.microsoft.com/office/powerpoint/2010/main" val="2932656494"/>
       </p:ext>
     </p:extLst>
   </p:cSld>
@@ -1154,7 +1154,7 @@
           <a:p>
             <a:fld id="{CC0F43FB-3F33-3F4B-9768-2FBED988F992}" type="slidenum">
               <a:rPr lang="en-IT" smtClean="0"/>
-              <a:t>21</a:t>
+              <a:t>19</a:t>
             </a:fld>
             <a:endParaRPr lang="en-IT"/>
           </a:p>
@@ -1163,7 +1163,7 @@
     </p:spTree>
     <p:extLst>
       <p:ext uri="{BB962C8B-B14F-4D97-AF65-F5344CB8AC3E}">
-        <p14:creationId xmlns:p14="http://schemas.microsoft.com/office/powerpoint/2010/main" val="417638834"/>
+        <p14:creationId xmlns:p14="http://schemas.microsoft.com/office/powerpoint/2010/main" val="361118316"/>
       </p:ext>
     </p:extLst>
   </p:cSld>
@@ -1238,7 +1238,7 @@
           <a:p>
             <a:fld id="{CC0F43FB-3F33-3F4B-9768-2FBED988F992}" type="slidenum">
               <a:rPr lang="en-IT" smtClean="0"/>
-              <a:t>23</a:t>
+              <a:t>21</a:t>
             </a:fld>
             <a:endParaRPr lang="en-IT"/>
           </a:p>
@@ -1247,7 +1247,7 @@
     </p:spTree>
     <p:extLst>
       <p:ext uri="{BB962C8B-B14F-4D97-AF65-F5344CB8AC3E}">
-        <p14:creationId xmlns:p14="http://schemas.microsoft.com/office/powerpoint/2010/main" val="1875895596"/>
+        <p14:creationId xmlns:p14="http://schemas.microsoft.com/office/powerpoint/2010/main" val="417638834"/>
       </p:ext>
     </p:extLst>
   </p:cSld>
@@ -1322,7 +1322,7 @@
           <a:p>
             <a:fld id="{CC0F43FB-3F33-3F4B-9768-2FBED988F992}" type="slidenum">
               <a:rPr lang="en-IT" smtClean="0"/>
-              <a:t>24</a:t>
+              <a:t>23</a:t>
             </a:fld>
             <a:endParaRPr lang="en-IT"/>
           </a:p>
@@ -1331,7 +1331,7 @@
     </p:spTree>
     <p:extLst>
       <p:ext uri="{BB962C8B-B14F-4D97-AF65-F5344CB8AC3E}">
-        <p14:creationId xmlns:p14="http://schemas.microsoft.com/office/powerpoint/2010/main" val="987308265"/>
+        <p14:creationId xmlns:p14="http://schemas.microsoft.com/office/powerpoint/2010/main" val="1875895596"/>
       </p:ext>
     </p:extLst>
   </p:cSld>
@@ -1406,7 +1406,7 @@
           <a:p>
             <a:fld id="{CC0F43FB-3F33-3F4B-9768-2FBED988F992}" type="slidenum">
               <a:rPr lang="en-IT" smtClean="0"/>
-              <a:t>25</a:t>
+              <a:t>24</a:t>
             </a:fld>
             <a:endParaRPr lang="en-IT"/>
           </a:p>
@@ -1415,7 +1415,7 @@
     </p:spTree>
     <p:extLst>
       <p:ext uri="{BB962C8B-B14F-4D97-AF65-F5344CB8AC3E}">
-        <p14:creationId xmlns:p14="http://schemas.microsoft.com/office/powerpoint/2010/main" val="879250274"/>
+        <p14:creationId xmlns:p14="http://schemas.microsoft.com/office/powerpoint/2010/main" val="987308265"/>
       </p:ext>
     </p:extLst>
   </p:cSld>
@@ -1490,7 +1490,7 @@
           <a:p>
             <a:fld id="{CC0F43FB-3F33-3F4B-9768-2FBED988F992}" type="slidenum">
               <a:rPr lang="en-IT" smtClean="0"/>
-              <a:t>4</a:t>
+              <a:t>3</a:t>
             </a:fld>
             <a:endParaRPr lang="en-IT"/>
           </a:p>
@@ -1499,7 +1499,7 @@
     </p:spTree>
     <p:extLst>
       <p:ext uri="{BB962C8B-B14F-4D97-AF65-F5344CB8AC3E}">
-        <p14:creationId xmlns:p14="http://schemas.microsoft.com/office/powerpoint/2010/main" val="3941390533"/>
+        <p14:creationId xmlns:p14="http://schemas.microsoft.com/office/powerpoint/2010/main" val="2426855832"/>
       </p:ext>
     </p:extLst>
   </p:cSld>
@@ -1574,7 +1574,7 @@
           <a:p>
             <a:fld id="{CC0F43FB-3F33-3F4B-9768-2FBED988F992}" type="slidenum">
               <a:rPr lang="en-IT" smtClean="0"/>
-              <a:t>26</a:t>
+              <a:t>25</a:t>
             </a:fld>
             <a:endParaRPr lang="en-IT"/>
           </a:p>
@@ -1583,7 +1583,7 @@
     </p:spTree>
     <p:extLst>
       <p:ext uri="{BB962C8B-B14F-4D97-AF65-F5344CB8AC3E}">
-        <p14:creationId xmlns:p14="http://schemas.microsoft.com/office/powerpoint/2010/main" val="769967792"/>
+        <p14:creationId xmlns:p14="http://schemas.microsoft.com/office/powerpoint/2010/main" val="879250274"/>
       </p:ext>
     </p:extLst>
   </p:cSld>
@@ -1658,7 +1658,7 @@
           <a:p>
             <a:fld id="{CC0F43FB-3F33-3F4B-9768-2FBED988F992}" type="slidenum">
               <a:rPr lang="en-IT" smtClean="0"/>
-              <a:t>27</a:t>
+              <a:t>26</a:t>
             </a:fld>
             <a:endParaRPr lang="en-IT"/>
           </a:p>
@@ -1667,7 +1667,7 @@
     </p:spTree>
     <p:extLst>
       <p:ext uri="{BB962C8B-B14F-4D97-AF65-F5344CB8AC3E}">
-        <p14:creationId xmlns:p14="http://schemas.microsoft.com/office/powerpoint/2010/main" val="3151892534"/>
+        <p14:creationId xmlns:p14="http://schemas.microsoft.com/office/powerpoint/2010/main" val="769967792"/>
       </p:ext>
     </p:extLst>
   </p:cSld>
@@ -1742,7 +1742,7 @@
           <a:p>
             <a:fld id="{CC0F43FB-3F33-3F4B-9768-2FBED988F992}" type="slidenum">
               <a:rPr lang="en-IT" smtClean="0"/>
-              <a:t>28</a:t>
+              <a:t>27</a:t>
             </a:fld>
             <a:endParaRPr lang="en-IT"/>
           </a:p>
@@ -1751,7 +1751,7 @@
     </p:spTree>
     <p:extLst>
       <p:ext uri="{BB962C8B-B14F-4D97-AF65-F5344CB8AC3E}">
-        <p14:creationId xmlns:p14="http://schemas.microsoft.com/office/powerpoint/2010/main" val="599017973"/>
+        <p14:creationId xmlns:p14="http://schemas.microsoft.com/office/powerpoint/2010/main" val="3151892534"/>
       </p:ext>
     </p:extLst>
   </p:cSld>
@@ -1826,6 +1826,90 @@
           <a:p>
             <a:fld id="{CC0F43FB-3F33-3F4B-9768-2FBED988F992}" type="slidenum">
               <a:rPr lang="en-IT" smtClean="0"/>
+              <a:t>28</a:t>
+            </a:fld>
+            <a:endParaRPr lang="en-IT"/>
+          </a:p>
+        </p:txBody>
+      </p:sp>
+    </p:spTree>
+    <p:extLst>
+      <p:ext uri="{BB962C8B-B14F-4D97-AF65-F5344CB8AC3E}">
+        <p14:creationId xmlns:p14="http://schemas.microsoft.com/office/powerpoint/2010/main" val="599017973"/>
+      </p:ext>
+    </p:extLst>
+  </p:cSld>
+  <p:clrMapOvr>
+    <a:masterClrMapping/>
+  </p:clrMapOvr>
+</p:notes>
+</file>
+
+<file path=ppt/notesSlides/notesSlide24.xml><?xml version="1.0" encoding="utf-8"?>
+<p:notes xmlns:a="http://schemas.openxmlformats.org/drawingml/2006/main" xmlns:r="http://schemas.openxmlformats.org/officeDocument/2006/relationships" xmlns:p="http://schemas.openxmlformats.org/presentationml/2006/main">
+  <p:cSld>
+    <p:spTree>
+      <p:nvGrpSpPr>
+        <p:cNvPr id="1" name=""/>
+        <p:cNvGrpSpPr/>
+        <p:nvPr/>
+      </p:nvGrpSpPr>
+      <p:grpSpPr>
+        <a:xfrm>
+          <a:off x="0" y="0"/>
+          <a:ext cx="0" cy="0"/>
+          <a:chOff x="0" y="0"/>
+          <a:chExt cx="0" cy="0"/>
+        </a:xfrm>
+      </p:grpSpPr>
+      <p:sp>
+        <p:nvSpPr>
+          <p:cNvPr id="2" name="Slide Image Placeholder 1"/>
+          <p:cNvSpPr>
+            <a:spLocks noGrp="1" noRot="1" noChangeAspect="1"/>
+          </p:cNvSpPr>
+          <p:nvPr>
+            <p:ph type="sldImg"/>
+          </p:nvPr>
+        </p:nvSpPr>
+        <p:spPr/>
+      </p:sp>
+      <p:sp>
+        <p:nvSpPr>
+          <p:cNvPr id="3" name="Notes Placeholder 2"/>
+          <p:cNvSpPr>
+            <a:spLocks noGrp="1"/>
+          </p:cNvSpPr>
+          <p:nvPr>
+            <p:ph type="body" idx="1"/>
+          </p:nvPr>
+        </p:nvSpPr>
+        <p:spPr/>
+        <p:txBody>
+          <a:bodyPr/>
+          <a:lstStyle/>
+          <a:p>
+            <a:endParaRPr lang="en-IT" dirty="0"/>
+          </a:p>
+        </p:txBody>
+      </p:sp>
+      <p:sp>
+        <p:nvSpPr>
+          <p:cNvPr id="4" name="Slide Number Placeholder 3"/>
+          <p:cNvSpPr>
+            <a:spLocks noGrp="1"/>
+          </p:cNvSpPr>
+          <p:nvPr>
+            <p:ph type="sldNum" sz="quarter" idx="5"/>
+          </p:nvPr>
+        </p:nvSpPr>
+        <p:spPr/>
+        <p:txBody>
+          <a:bodyPr/>
+          <a:lstStyle/>
+          <a:p>
+            <a:fld id="{CC0F43FB-3F33-3F4B-9768-2FBED988F992}" type="slidenum">
+              <a:rPr lang="en-IT" smtClean="0"/>
               <a:t>29</a:t>
             </a:fld>
             <a:endParaRPr lang="en-IT"/>
@@ -1845,7 +1929,7 @@
 </p:notes>
 </file>
 
-<file path=ppt/notesSlides/notesSlide24.xml><?xml version="1.0" encoding="utf-8"?>
+<file path=ppt/notesSlides/notesSlide25.xml><?xml version="1.0" encoding="utf-8"?>
 <p:notes xmlns:a="http://schemas.openxmlformats.org/drawingml/2006/main" xmlns:r="http://schemas.openxmlformats.org/officeDocument/2006/relationships" xmlns:p="http://schemas.openxmlformats.org/presentationml/2006/main">
   <p:cSld>
     <p:spTree>
@@ -1994,7 +2078,7 @@
           <a:p>
             <a:fld id="{CC0F43FB-3F33-3F4B-9768-2FBED988F992}" type="slidenum">
               <a:rPr lang="en-IT" smtClean="0"/>
-              <a:t>6</a:t>
+              <a:t>4</a:t>
             </a:fld>
             <a:endParaRPr lang="en-IT"/>
           </a:p>
@@ -2003,7 +2087,7 @@
     </p:spTree>
     <p:extLst>
       <p:ext uri="{BB962C8B-B14F-4D97-AF65-F5344CB8AC3E}">
-        <p14:creationId xmlns:p14="http://schemas.microsoft.com/office/powerpoint/2010/main" val="548012210"/>
+        <p14:creationId xmlns:p14="http://schemas.microsoft.com/office/powerpoint/2010/main" val="3941390533"/>
       </p:ext>
     </p:extLst>
   </p:cSld>
@@ -2078,7 +2162,7 @@
           <a:p>
             <a:fld id="{CC0F43FB-3F33-3F4B-9768-2FBED988F992}" type="slidenum">
               <a:rPr lang="en-IT" smtClean="0"/>
-              <a:t>7</a:t>
+              <a:t>6</a:t>
             </a:fld>
             <a:endParaRPr lang="en-IT"/>
           </a:p>
@@ -2087,7 +2171,7 @@
     </p:spTree>
     <p:extLst>
       <p:ext uri="{BB962C8B-B14F-4D97-AF65-F5344CB8AC3E}">
-        <p14:creationId xmlns:p14="http://schemas.microsoft.com/office/powerpoint/2010/main" val="1490808368"/>
+        <p14:creationId xmlns:p14="http://schemas.microsoft.com/office/powerpoint/2010/main" val="548012210"/>
       </p:ext>
     </p:extLst>
   </p:cSld>
@@ -2162,7 +2246,7 @@
           <a:p>
             <a:fld id="{CC0F43FB-3F33-3F4B-9768-2FBED988F992}" type="slidenum">
               <a:rPr lang="en-IT" smtClean="0"/>
-              <a:t>8</a:t>
+              <a:t>7</a:t>
             </a:fld>
             <a:endParaRPr lang="en-IT"/>
           </a:p>
@@ -2171,7 +2255,7 @@
     </p:spTree>
     <p:extLst>
       <p:ext uri="{BB962C8B-B14F-4D97-AF65-F5344CB8AC3E}">
-        <p14:creationId xmlns:p14="http://schemas.microsoft.com/office/powerpoint/2010/main" val="3670675861"/>
+        <p14:creationId xmlns:p14="http://schemas.microsoft.com/office/powerpoint/2010/main" val="1490808368"/>
       </p:ext>
     </p:extLst>
   </p:cSld>
@@ -2246,7 +2330,7 @@
           <a:p>
             <a:fld id="{CC0F43FB-3F33-3F4B-9768-2FBED988F992}" type="slidenum">
               <a:rPr lang="en-IT" smtClean="0"/>
-              <a:t>9</a:t>
+              <a:t>8</a:t>
             </a:fld>
             <a:endParaRPr lang="en-IT"/>
           </a:p>
@@ -2255,7 +2339,7 @@
     </p:spTree>
     <p:extLst>
       <p:ext uri="{BB962C8B-B14F-4D97-AF65-F5344CB8AC3E}">
-        <p14:creationId xmlns:p14="http://schemas.microsoft.com/office/powerpoint/2010/main" val="2564456326"/>
+        <p14:creationId xmlns:p14="http://schemas.microsoft.com/office/powerpoint/2010/main" val="3670675861"/>
       </p:ext>
     </p:extLst>
   </p:cSld>
@@ -2330,7 +2414,7 @@
           <a:p>
             <a:fld id="{CC0F43FB-3F33-3F4B-9768-2FBED988F992}" type="slidenum">
               <a:rPr lang="en-IT" smtClean="0"/>
-              <a:t>10</a:t>
+              <a:t>9</a:t>
             </a:fld>
             <a:endParaRPr lang="en-IT"/>
           </a:p>
@@ -2339,7 +2423,7 @@
     </p:spTree>
     <p:extLst>
       <p:ext uri="{BB962C8B-B14F-4D97-AF65-F5344CB8AC3E}">
-        <p14:creationId xmlns:p14="http://schemas.microsoft.com/office/powerpoint/2010/main" val="1241454245"/>
+        <p14:creationId xmlns:p14="http://schemas.microsoft.com/office/powerpoint/2010/main" val="2564456326"/>
       </p:ext>
     </p:extLst>
   </p:cSld>
@@ -2414,7 +2498,7 @@
           <a:p>
             <a:fld id="{CC0F43FB-3F33-3F4B-9768-2FBED988F992}" type="slidenum">
               <a:rPr lang="en-IT" smtClean="0"/>
-              <a:t>11</a:t>
+              <a:t>10</a:t>
             </a:fld>
             <a:endParaRPr lang="en-IT"/>
           </a:p>
@@ -2423,7 +2507,7 @@
     </p:spTree>
     <p:extLst>
       <p:ext uri="{BB962C8B-B14F-4D97-AF65-F5344CB8AC3E}">
-        <p14:creationId xmlns:p14="http://schemas.microsoft.com/office/powerpoint/2010/main" val="128434096"/>
+        <p14:creationId xmlns:p14="http://schemas.microsoft.com/office/powerpoint/2010/main" val="1241454245"/>
       </p:ext>
     </p:extLst>
   </p:cSld>
@@ -2498,7 +2582,7 @@
           <a:p>
             <a:fld id="{CC0F43FB-3F33-3F4B-9768-2FBED988F992}" type="slidenum">
               <a:rPr lang="en-IT" smtClean="0"/>
-              <a:t>12</a:t>
+              <a:t>11</a:t>
             </a:fld>
             <a:endParaRPr lang="en-IT"/>
           </a:p>
@@ -2507,7 +2591,7 @@
     </p:spTree>
     <p:extLst>
       <p:ext uri="{BB962C8B-B14F-4D97-AF65-F5344CB8AC3E}">
-        <p14:creationId xmlns:p14="http://schemas.microsoft.com/office/powerpoint/2010/main" val="3798116206"/>
+        <p14:creationId xmlns:p14="http://schemas.microsoft.com/office/powerpoint/2010/main" val="128434096"/>
       </p:ext>
     </p:extLst>
   </p:cSld>
@@ -14159,52 +14243,100 @@
           <a:lstStyle/>
           <a:p>
             <a:r>
-              <a:rPr lang="en-IT" dirty="0"/>
+              <a:rPr lang="en-IT" b="1" dirty="0"/>
               <a:t>Recap</a:t>
             </a:r>
           </a:p>
           <a:p>
             <a:r>
-              <a:rPr lang="en-IT" dirty="0"/>
+              <a:rPr lang="en-IT" dirty="0">
+                <a:solidFill>
+                  <a:schemeClr val="bg1">
+                    <a:lumMod val="75000"/>
+                  </a:schemeClr>
+                </a:solidFill>
+              </a:rPr>
               <a:t>Classes</a:t>
             </a:r>
           </a:p>
           <a:p>
             <a:r>
-              <a:rPr lang="en-IT" dirty="0"/>
+              <a:rPr lang="en-IT" dirty="0">
+                <a:solidFill>
+                  <a:schemeClr val="bg1">
+                    <a:lumMod val="75000"/>
+                  </a:schemeClr>
+                </a:solidFill>
+              </a:rPr>
               <a:t>Inheritance</a:t>
             </a:r>
           </a:p>
           <a:p>
             <a:r>
-              <a:rPr lang="en-IT" dirty="0"/>
+              <a:rPr lang="en-IT" dirty="0">
+                <a:solidFill>
+                  <a:schemeClr val="bg1">
+                    <a:lumMod val="75000"/>
+                  </a:schemeClr>
+                </a:solidFill>
+              </a:rPr>
               <a:t>Other things</a:t>
             </a:r>
           </a:p>
           <a:p>
             <a:r>
-              <a:rPr lang="en-IT" dirty="0"/>
+              <a:rPr lang="en-IT" dirty="0">
+                <a:solidFill>
+                  <a:schemeClr val="bg1">
+                    <a:lumMod val="75000"/>
+                  </a:schemeClr>
+                </a:solidFill>
+              </a:rPr>
               <a:t>Asynchrony</a:t>
             </a:r>
           </a:p>
           <a:p>
-            <a:endParaRPr lang="en-IT" dirty="0"/>
-          </a:p>
-          <a:p>
-            <a:r>
-              <a:rPr lang="en-IT" dirty="0"/>
+            <a:endParaRPr lang="en-IT" dirty="0">
+              <a:solidFill>
+                <a:schemeClr val="bg1">
+                  <a:lumMod val="75000"/>
+                </a:schemeClr>
+              </a:solidFill>
+            </a:endParaRPr>
+          </a:p>
+          <a:p>
+            <a:r>
+              <a:rPr lang="en-IT" dirty="0">
+                <a:solidFill>
+                  <a:schemeClr val="bg1">
+                    <a:lumMod val="75000"/>
+                  </a:schemeClr>
+                </a:solidFill>
+              </a:rPr>
               <a:t>Exercises</a:t>
             </a:r>
           </a:p>
           <a:p>
             <a:r>
-              <a:rPr lang="en-IT" dirty="0"/>
+              <a:rPr lang="en-IT" dirty="0">
+                <a:solidFill>
+                  <a:schemeClr val="bg1">
+                    <a:lumMod val="75000"/>
+                  </a:schemeClr>
+                </a:solidFill>
+              </a:rPr>
               <a:t>Homework</a:t>
             </a:r>
           </a:p>
           <a:p>
             <a:r>
-              <a:rPr lang="en-IT" dirty="0"/>
+              <a:rPr lang="en-IT" dirty="0">
+                <a:solidFill>
+                  <a:schemeClr val="bg1">
+                    <a:lumMod val="75000"/>
+                  </a:schemeClr>
+                </a:solidFill>
+              </a:rPr>
               <a:t>Resources</a:t>
             </a:r>
           </a:p>
@@ -14213,7 +14345,7 @@
     </p:spTree>
     <p:extLst>
       <p:ext uri="{BB962C8B-B14F-4D97-AF65-F5344CB8AC3E}">
-        <p14:creationId xmlns:p14="http://schemas.microsoft.com/office/powerpoint/2010/main" val="3956301766"/>
+        <p14:creationId xmlns:p14="http://schemas.microsoft.com/office/powerpoint/2010/main" val="357888541"/>
       </p:ext>
     </p:extLst>
   </p:cSld>
@@ -16863,138 +16995,2097 @@
           <a:p>
             <a:r>
               <a:rPr lang="en-IT" dirty="0"/>
-              <a:t>Outline</a:t>
+              <a:t>Recap</a:t>
             </a:r>
           </a:p>
         </p:txBody>
       </p:sp>
       <p:sp>
         <p:nvSpPr>
-          <p:cNvPr id="3" name="Content Placeholder 2">
+          <p:cNvPr id="6" name="Rectangle 5">
             <a:extLst>
               <a:ext uri="{FF2B5EF4-FFF2-40B4-BE49-F238E27FC236}">
-                <a16:creationId xmlns:a16="http://schemas.microsoft.com/office/drawing/2014/main" id="{8962CCAC-9D70-C543-BBE0-822B6CB5F5CB}"/>
+                <a16:creationId xmlns:a16="http://schemas.microsoft.com/office/drawing/2014/main" id="{4F59339E-8A81-2441-8894-466CF2091C4C}"/>
               </a:ext>
             </a:extLst>
           </p:cNvPr>
-          <p:cNvSpPr>
-            <a:spLocks noGrp="1"/>
+          <p:cNvSpPr/>
+          <p:nvPr/>
+        </p:nvSpPr>
+        <p:spPr>
+          <a:xfrm>
+            <a:off x="3262086" y="2757271"/>
+            <a:ext cx="2571750" cy="860243"/>
+          </a:xfrm>
+          <a:prstGeom prst="rect">
+            <a:avLst/>
+          </a:prstGeom>
+          <a:ln w="38100">
+            <a:solidFill>
+              <a:schemeClr val="accent1"/>
+            </a:solidFill>
+          </a:ln>
+        </p:spPr>
+        <p:style>
+          <a:lnRef idx="2">
+            <a:schemeClr val="accent6"/>
+          </a:lnRef>
+          <a:fillRef idx="1">
+            <a:schemeClr val="lt1"/>
+          </a:fillRef>
+          <a:effectRef idx="0">
+            <a:schemeClr val="accent6"/>
+          </a:effectRef>
+          <a:fontRef idx="minor">
+            <a:schemeClr val="dk1"/>
+          </a:fontRef>
+        </p:style>
+        <p:txBody>
+          <a:bodyPr rtlCol="0" anchor="ctr"/>
+          <a:lstStyle/>
+          <a:p>
+            <a:pPr algn="ctr"/>
+            <a:r>
+              <a:rPr lang="en-IT" dirty="0">
+                <a:latin typeface="Palatino Linotype" panose="02040502050505030304" pitchFamily="18" charset="0"/>
+              </a:rPr>
+              <a:t>Navigate between screens</a:t>
+            </a:r>
+          </a:p>
+        </p:txBody>
+      </p:sp>
+      <p:sp>
+        <p:nvSpPr>
+          <p:cNvPr id="8" name="Rectangle 7">
+            <a:extLst>
+              <a:ext uri="{FF2B5EF4-FFF2-40B4-BE49-F238E27FC236}">
+                <a16:creationId xmlns:a16="http://schemas.microsoft.com/office/drawing/2014/main" id="{A3DA10E2-4B67-4448-8871-FA03D68FCBE9}"/>
+              </a:ext>
+            </a:extLst>
+          </p:cNvPr>
+          <p:cNvSpPr/>
+          <p:nvPr/>
+        </p:nvSpPr>
+        <p:spPr>
+          <a:xfrm>
+            <a:off x="6301925" y="1506748"/>
+            <a:ext cx="2571750" cy="860243"/>
+          </a:xfrm>
+          <a:prstGeom prst="rect">
+            <a:avLst/>
+          </a:prstGeom>
+          <a:noFill/>
+          <a:ln w="38100">
+            <a:solidFill>
+              <a:srgbClr val="FFC000"/>
+            </a:solidFill>
+          </a:ln>
+        </p:spPr>
+        <p:style>
+          <a:lnRef idx="2">
+            <a:schemeClr val="accent6"/>
+          </a:lnRef>
+          <a:fillRef idx="1">
+            <a:schemeClr val="lt1"/>
+          </a:fillRef>
+          <a:effectRef idx="0">
+            <a:schemeClr val="accent6"/>
+          </a:effectRef>
+          <a:fontRef idx="minor">
+            <a:schemeClr val="dk1"/>
+          </a:fontRef>
+        </p:style>
+        <p:txBody>
+          <a:bodyPr rtlCol="0" anchor="ctr"/>
+          <a:lstStyle/>
+          <a:p>
+            <a:pPr algn="ctr"/>
+            <a:r>
+              <a:rPr lang="en-IT" dirty="0">
+                <a:latin typeface="Palatino Linotype" panose="02040502050505030304" pitchFamily="18" charset="0"/>
+              </a:rPr>
+              <a:t>Make simple API calls</a:t>
+            </a:r>
+          </a:p>
+        </p:txBody>
+      </p:sp>
+      <p:sp>
+        <p:nvSpPr>
+          <p:cNvPr id="9" name="Rectangle 8">
+            <a:extLst>
+              <a:ext uri="{FF2B5EF4-FFF2-40B4-BE49-F238E27FC236}">
+                <a16:creationId xmlns:a16="http://schemas.microsoft.com/office/drawing/2014/main" id="{91A96BC1-682C-AC4F-AE0B-DE841D7AAA23}"/>
+              </a:ext>
+            </a:extLst>
+          </p:cNvPr>
+          <p:cNvSpPr/>
+          <p:nvPr/>
+        </p:nvSpPr>
+        <p:spPr>
+          <a:xfrm>
+            <a:off x="6287293" y="2757271"/>
+            <a:ext cx="2571750" cy="860243"/>
+          </a:xfrm>
+          <a:prstGeom prst="rect">
+            <a:avLst/>
+          </a:prstGeom>
+          <a:ln w="38100">
+            <a:solidFill>
+              <a:srgbClr val="FFC000"/>
+            </a:solidFill>
+          </a:ln>
+        </p:spPr>
+        <p:style>
+          <a:lnRef idx="2">
+            <a:schemeClr val="accent6"/>
+          </a:lnRef>
+          <a:fillRef idx="1">
+            <a:schemeClr val="lt1"/>
+          </a:fillRef>
+          <a:effectRef idx="0">
+            <a:schemeClr val="accent6"/>
+          </a:effectRef>
+          <a:fontRef idx="minor">
+            <a:schemeClr val="dk1"/>
+          </a:fontRef>
+        </p:style>
+        <p:txBody>
+          <a:bodyPr rtlCol="0" anchor="ctr"/>
+          <a:lstStyle/>
+          <a:p>
+            <a:pPr algn="ctr"/>
+            <a:r>
+              <a:rPr lang="en-IT" dirty="0">
+                <a:latin typeface="Palatino Linotype" panose="02040502050505030304" pitchFamily="18" charset="0"/>
+              </a:rPr>
+              <a:t>Fetch wearable data</a:t>
+            </a:r>
+          </a:p>
+        </p:txBody>
+      </p:sp>
+      <p:sp>
+        <p:nvSpPr>
+          <p:cNvPr id="11" name="Rectangle 10">
+            <a:extLst>
+              <a:ext uri="{FF2B5EF4-FFF2-40B4-BE49-F238E27FC236}">
+                <a16:creationId xmlns:a16="http://schemas.microsoft.com/office/drawing/2014/main" id="{DA0C45BF-9708-D246-AF7A-63F93085FA1B}"/>
+              </a:ext>
+            </a:extLst>
+          </p:cNvPr>
+          <p:cNvSpPr/>
+          <p:nvPr/>
+        </p:nvSpPr>
+        <p:spPr>
+          <a:xfrm>
+            <a:off x="3262086" y="1510133"/>
+            <a:ext cx="2571750" cy="860243"/>
+          </a:xfrm>
+          <a:prstGeom prst="rect">
+            <a:avLst/>
+          </a:prstGeom>
+          <a:noFill/>
+          <a:ln w="38100">
+            <a:solidFill>
+              <a:schemeClr val="accent1"/>
+            </a:solidFill>
+          </a:ln>
+        </p:spPr>
+        <p:style>
+          <a:lnRef idx="2">
+            <a:schemeClr val="accent6"/>
+          </a:lnRef>
+          <a:fillRef idx="1">
+            <a:schemeClr val="lt1"/>
+          </a:fillRef>
+          <a:effectRef idx="0">
+            <a:schemeClr val="accent6"/>
+          </a:effectRef>
+          <a:fontRef idx="minor">
+            <a:schemeClr val="dk1"/>
+          </a:fontRef>
+        </p:style>
+        <p:txBody>
+          <a:bodyPr rtlCol="0" anchor="ctr"/>
+          <a:lstStyle/>
+          <a:p>
+            <a:pPr algn="ctr"/>
+            <a:r>
+              <a:rPr lang="en-IT" dirty="0">
+                <a:latin typeface="Palatino Linotype" panose="02040502050505030304" pitchFamily="18" charset="0"/>
+              </a:rPr>
+              <a:t>Create a layout</a:t>
+            </a:r>
+          </a:p>
+        </p:txBody>
+      </p:sp>
+      <p:sp>
+        <p:nvSpPr>
+          <p:cNvPr id="12" name="Rectangle 11">
+            <a:extLst>
+              <a:ext uri="{FF2B5EF4-FFF2-40B4-BE49-F238E27FC236}">
+                <a16:creationId xmlns:a16="http://schemas.microsoft.com/office/drawing/2014/main" id="{89A3CF9B-84DE-9A4C-9E18-FBA6C2A9FAAE}"/>
+              </a:ext>
+            </a:extLst>
+          </p:cNvPr>
+          <p:cNvSpPr/>
+          <p:nvPr/>
+        </p:nvSpPr>
+        <p:spPr>
+          <a:xfrm>
+            <a:off x="9303992" y="2752427"/>
+            <a:ext cx="2571750" cy="860243"/>
+          </a:xfrm>
+          <a:prstGeom prst="rect">
+            <a:avLst/>
+          </a:prstGeom>
+          <a:ln w="38100">
+            <a:solidFill>
+              <a:srgbClr val="7030A0"/>
+            </a:solidFill>
+          </a:ln>
+        </p:spPr>
+        <p:style>
+          <a:lnRef idx="2">
+            <a:schemeClr val="accent6"/>
+          </a:lnRef>
+          <a:fillRef idx="1">
+            <a:schemeClr val="lt1"/>
+          </a:fillRef>
+          <a:effectRef idx="0">
+            <a:schemeClr val="accent6"/>
+          </a:effectRef>
+          <a:fontRef idx="minor">
+            <a:schemeClr val="dk1"/>
+          </a:fontRef>
+        </p:style>
+        <p:txBody>
+          <a:bodyPr rtlCol="0" anchor="ctr"/>
+          <a:lstStyle/>
+          <a:p>
+            <a:pPr algn="ctr"/>
+            <a:r>
+              <a:rPr lang="en-IT" dirty="0">
+                <a:latin typeface="Palatino Linotype" panose="02040502050505030304" pitchFamily="18" charset="0"/>
+              </a:rPr>
+              <a:t>Persist user data</a:t>
+            </a:r>
+          </a:p>
+        </p:txBody>
+      </p:sp>
+      <p:sp>
+        <p:nvSpPr>
+          <p:cNvPr id="13" name="Rectangle 12">
+            <a:extLst>
+              <a:ext uri="{FF2B5EF4-FFF2-40B4-BE49-F238E27FC236}">
+                <a16:creationId xmlns:a16="http://schemas.microsoft.com/office/drawing/2014/main" id="{B59EA357-0CE7-EE42-AA24-CF594C57CF30}"/>
+              </a:ext>
+            </a:extLst>
+          </p:cNvPr>
+          <p:cNvSpPr/>
+          <p:nvPr/>
+        </p:nvSpPr>
+        <p:spPr>
+          <a:xfrm>
+            <a:off x="3262086" y="4006100"/>
+            <a:ext cx="2571750" cy="860243"/>
+          </a:xfrm>
+          <a:prstGeom prst="rect">
+            <a:avLst/>
+          </a:prstGeom>
+          <a:ln w="38100">
+            <a:solidFill>
+              <a:schemeClr val="accent1"/>
+            </a:solidFill>
+          </a:ln>
+        </p:spPr>
+        <p:style>
+          <a:lnRef idx="2">
+            <a:schemeClr val="accent6"/>
+          </a:lnRef>
+          <a:fillRef idx="1">
+            <a:schemeClr val="lt1"/>
+          </a:fillRef>
+          <a:effectRef idx="0">
+            <a:schemeClr val="accent6"/>
+          </a:effectRef>
+          <a:fontRef idx="minor">
+            <a:schemeClr val="dk1"/>
+          </a:fontRef>
+        </p:style>
+        <p:txBody>
+          <a:bodyPr rtlCol="0" anchor="ctr"/>
+          <a:lstStyle/>
+          <a:p>
+            <a:pPr algn="ctr"/>
+            <a:r>
+              <a:rPr lang="en-IT" dirty="0">
+                <a:latin typeface="Palatino Linotype" panose="02040502050505030304" pitchFamily="18" charset="0"/>
+              </a:rPr>
+              <a:t>Manage the app state</a:t>
+            </a:r>
+          </a:p>
+        </p:txBody>
+      </p:sp>
+      <p:sp>
+        <p:nvSpPr>
+          <p:cNvPr id="14" name="Rectangle 13">
+            <a:extLst>
+              <a:ext uri="{FF2B5EF4-FFF2-40B4-BE49-F238E27FC236}">
+                <a16:creationId xmlns:a16="http://schemas.microsoft.com/office/drawing/2014/main" id="{59891CCE-800C-D14F-AC56-D2B57CD4489C}"/>
+              </a:ext>
+            </a:extLst>
+          </p:cNvPr>
+          <p:cNvSpPr/>
+          <p:nvPr/>
+        </p:nvSpPr>
+        <p:spPr>
+          <a:xfrm>
+            <a:off x="428173" y="4001893"/>
+            <a:ext cx="2571750" cy="860243"/>
+          </a:xfrm>
+          <a:prstGeom prst="rect">
+            <a:avLst/>
+          </a:prstGeom>
+          <a:ln w="38100">
+            <a:solidFill>
+              <a:schemeClr val="accent1"/>
+            </a:solidFill>
+          </a:ln>
+        </p:spPr>
+        <p:style>
+          <a:lnRef idx="2">
+            <a:schemeClr val="accent6"/>
+          </a:lnRef>
+          <a:fillRef idx="1">
+            <a:schemeClr val="lt1"/>
+          </a:fillRef>
+          <a:effectRef idx="0">
+            <a:schemeClr val="accent6"/>
+          </a:effectRef>
+          <a:fontRef idx="minor">
+            <a:schemeClr val="dk1"/>
+          </a:fontRef>
+        </p:style>
+        <p:txBody>
+          <a:bodyPr rtlCol="0" anchor="ctr"/>
+          <a:lstStyle/>
+          <a:p>
+            <a:pPr algn="ctr"/>
+            <a:r>
+              <a:rPr lang="en-IT" dirty="0">
+                <a:latin typeface="Palatino Linotype" panose="02040502050505030304" pitchFamily="18" charset="0"/>
+              </a:rPr>
+              <a:t>Understand Flutter’s principles</a:t>
+            </a:r>
+          </a:p>
+        </p:txBody>
+      </p:sp>
+      <p:sp>
+        <p:nvSpPr>
+          <p:cNvPr id="15" name="Rectangle 14">
+            <a:extLst>
+              <a:ext uri="{FF2B5EF4-FFF2-40B4-BE49-F238E27FC236}">
+                <a16:creationId xmlns:a16="http://schemas.microsoft.com/office/drawing/2014/main" id="{4578F71A-FE43-5D4A-9447-12A5D61DBED5}"/>
+              </a:ext>
+            </a:extLst>
+          </p:cNvPr>
+          <p:cNvSpPr/>
+          <p:nvPr/>
+        </p:nvSpPr>
+        <p:spPr>
+          <a:xfrm>
+            <a:off x="428173" y="2757271"/>
+            <a:ext cx="2571750" cy="860243"/>
+          </a:xfrm>
+          <a:prstGeom prst="rect">
+            <a:avLst/>
+          </a:prstGeom>
+          <a:solidFill>
+            <a:srgbClr val="FFFF00"/>
+          </a:solidFill>
+          <a:ln w="38100">
+            <a:solidFill>
+              <a:schemeClr val="accent1"/>
+            </a:solidFill>
+          </a:ln>
+        </p:spPr>
+        <p:style>
+          <a:lnRef idx="2">
+            <a:schemeClr val="accent6"/>
+          </a:lnRef>
+          <a:fillRef idx="1">
+            <a:schemeClr val="lt1"/>
+          </a:fillRef>
+          <a:effectRef idx="0">
+            <a:schemeClr val="accent6"/>
+          </a:effectRef>
+          <a:fontRef idx="minor">
+            <a:schemeClr val="dk1"/>
+          </a:fontRef>
+        </p:style>
+        <p:txBody>
+          <a:bodyPr rtlCol="0" anchor="ctr"/>
+          <a:lstStyle/>
+          <a:p>
+            <a:pPr algn="ctr"/>
+            <a:r>
+              <a:rPr lang="en-IT" dirty="0">
+                <a:latin typeface="Palatino Linotype" panose="02040502050505030304" pitchFamily="18" charset="0"/>
+              </a:rPr>
+              <a:t>Get familiar with Dart</a:t>
+            </a:r>
+          </a:p>
+        </p:txBody>
+      </p:sp>
+      <p:sp>
+        <p:nvSpPr>
+          <p:cNvPr id="16" name="Rectangle 15">
+            <a:extLst>
+              <a:ext uri="{FF2B5EF4-FFF2-40B4-BE49-F238E27FC236}">
+                <a16:creationId xmlns:a16="http://schemas.microsoft.com/office/drawing/2014/main" id="{F06EC684-AEE0-714D-BA51-7C00C2C4DCF1}"/>
+              </a:ext>
+            </a:extLst>
+          </p:cNvPr>
+          <p:cNvSpPr/>
+          <p:nvPr/>
+        </p:nvSpPr>
+        <p:spPr>
+          <a:xfrm>
+            <a:off x="428173" y="1510134"/>
+            <a:ext cx="2571750" cy="860243"/>
+          </a:xfrm>
+          <a:prstGeom prst="rect">
+            <a:avLst/>
+          </a:prstGeom>
+          <a:ln w="38100">
+            <a:solidFill>
+              <a:schemeClr val="accent1"/>
+            </a:solidFill>
+          </a:ln>
+        </p:spPr>
+        <p:style>
+          <a:lnRef idx="2">
+            <a:schemeClr val="accent6"/>
+          </a:lnRef>
+          <a:fillRef idx="1">
+            <a:schemeClr val="lt1"/>
+          </a:fillRef>
+          <a:effectRef idx="0">
+            <a:schemeClr val="accent6"/>
+          </a:effectRef>
+          <a:fontRef idx="minor">
+            <a:schemeClr val="dk1"/>
+          </a:fontRef>
+        </p:style>
+        <p:txBody>
+          <a:bodyPr rtlCol="0" anchor="ctr"/>
+          <a:lstStyle/>
+          <a:p>
+            <a:pPr algn="ctr"/>
+            <a:r>
+              <a:rPr lang="en-IT" dirty="0">
+                <a:latin typeface="Palatino Linotype" panose="02040502050505030304" pitchFamily="18" charset="0"/>
+              </a:rPr>
+              <a:t>Collaborate and version code</a:t>
+            </a:r>
+          </a:p>
+        </p:txBody>
+      </p:sp>
+      <p:sp>
+        <p:nvSpPr>
+          <p:cNvPr id="17" name="Rectangle 16">
+            <a:extLst>
+              <a:ext uri="{FF2B5EF4-FFF2-40B4-BE49-F238E27FC236}">
+                <a16:creationId xmlns:a16="http://schemas.microsoft.com/office/drawing/2014/main" id="{C2EFE1B8-79ED-B645-A1A5-DD1C452F5C1B}"/>
+              </a:ext>
+            </a:extLst>
+          </p:cNvPr>
+          <p:cNvSpPr/>
+          <p:nvPr/>
+        </p:nvSpPr>
+        <p:spPr>
+          <a:xfrm>
+            <a:off x="9303992" y="1498505"/>
+            <a:ext cx="2571750" cy="860243"/>
+          </a:xfrm>
+          <a:prstGeom prst="rect">
+            <a:avLst/>
+          </a:prstGeom>
+          <a:ln w="38100">
+            <a:solidFill>
+              <a:srgbClr val="7030A0"/>
+            </a:solidFill>
+          </a:ln>
+        </p:spPr>
+        <p:style>
+          <a:lnRef idx="2">
+            <a:schemeClr val="accent6"/>
+          </a:lnRef>
+          <a:fillRef idx="1">
+            <a:schemeClr val="lt1"/>
+          </a:fillRef>
+          <a:effectRef idx="0">
+            <a:schemeClr val="accent6"/>
+          </a:effectRef>
+          <a:fontRef idx="minor">
+            <a:schemeClr val="dk1"/>
+          </a:fontRef>
+        </p:style>
+        <p:txBody>
+          <a:bodyPr rtlCol="0" anchor="ctr"/>
+          <a:lstStyle/>
+          <a:p>
+            <a:pPr algn="ctr"/>
+            <a:r>
+              <a:rPr lang="en-IT" dirty="0">
+                <a:latin typeface="Palatino Linotype" panose="02040502050505030304" pitchFamily="18" charset="0"/>
+              </a:rPr>
+              <a:t>Implement user authentication</a:t>
+            </a:r>
+          </a:p>
+        </p:txBody>
+      </p:sp>
+      <p:sp>
+        <p:nvSpPr>
+          <p:cNvPr id="18" name="Rectangle 17">
+            <a:extLst>
+              <a:ext uri="{FF2B5EF4-FFF2-40B4-BE49-F238E27FC236}">
+                <a16:creationId xmlns:a16="http://schemas.microsoft.com/office/drawing/2014/main" id="{7A69206F-E158-C04A-AA9B-1F9FCE860BD3}"/>
+              </a:ext>
+            </a:extLst>
+          </p:cNvPr>
+          <p:cNvSpPr/>
+          <p:nvPr/>
+        </p:nvSpPr>
+        <p:spPr>
+          <a:xfrm>
+            <a:off x="428173" y="5818578"/>
+            <a:ext cx="11553370" cy="453753"/>
+          </a:xfrm>
+          <a:prstGeom prst="rect">
+            <a:avLst/>
+          </a:prstGeom>
+          <a:ln w="38100"/>
+        </p:spPr>
+        <p:style>
+          <a:lnRef idx="2">
+            <a:schemeClr val="accent6"/>
+          </a:lnRef>
+          <a:fillRef idx="1">
+            <a:schemeClr val="lt1"/>
+          </a:fillRef>
+          <a:effectRef idx="0">
+            <a:schemeClr val="accent6"/>
+          </a:effectRef>
+          <a:fontRef idx="minor">
+            <a:schemeClr val="dk1"/>
+          </a:fontRef>
+        </p:style>
+        <p:txBody>
+          <a:bodyPr rtlCol="0" anchor="ctr"/>
+          <a:lstStyle/>
+          <a:p>
+            <a:pPr algn="ctr"/>
+            <a:r>
+              <a:rPr lang="en-IT" dirty="0">
+                <a:latin typeface="Palatino Linotype" panose="02040502050505030304" pitchFamily="18" charset="0"/>
+              </a:rPr>
+              <a:t>Do something with your fantasy</a:t>
+            </a:r>
+          </a:p>
+        </p:txBody>
+      </p:sp>
+      <p:cxnSp>
+        <p:nvCxnSpPr>
+          <p:cNvPr id="24" name="Straight Connector 23">
+            <a:extLst>
+              <a:ext uri="{FF2B5EF4-FFF2-40B4-BE49-F238E27FC236}">
+                <a16:creationId xmlns:a16="http://schemas.microsoft.com/office/drawing/2014/main" id="{F46B9E0C-1958-334C-8E68-E5B5D895F3A0}"/>
+              </a:ext>
+            </a:extLst>
+          </p:cNvPr>
+          <p:cNvCxnSpPr>
+            <a:cxnSpLocks/>
+          </p:cNvCxnSpPr>
+          <p:nvPr/>
+        </p:nvCxnSpPr>
+        <p:spPr>
+          <a:xfrm>
+            <a:off x="11981543" y="1231320"/>
+            <a:ext cx="0" cy="4088165"/>
+          </a:xfrm>
+          <a:prstGeom prst="line">
+            <a:avLst/>
+          </a:prstGeom>
+          <a:ln w="38100">
+            <a:solidFill>
+              <a:srgbClr val="7030A0"/>
+            </a:solidFill>
+          </a:ln>
+        </p:spPr>
+        <p:style>
+          <a:lnRef idx="1">
+            <a:schemeClr val="accent6"/>
+          </a:lnRef>
+          <a:fillRef idx="0">
+            <a:schemeClr val="accent6"/>
+          </a:fillRef>
+          <a:effectRef idx="0">
+            <a:schemeClr val="accent6"/>
+          </a:effectRef>
+          <a:fontRef idx="minor">
+            <a:schemeClr val="tx1"/>
+          </a:fontRef>
+        </p:style>
+      </p:cxnSp>
+      <p:sp>
+        <p:nvSpPr>
+          <p:cNvPr id="25" name="Content Placeholder 2">
+            <a:extLst>
+              <a:ext uri="{FF2B5EF4-FFF2-40B4-BE49-F238E27FC236}">
+                <a16:creationId xmlns:a16="http://schemas.microsoft.com/office/drawing/2014/main" id="{B714A049-D46C-4741-AC57-5ADD5A556D5E}"/>
+              </a:ext>
+            </a:extLst>
+          </p:cNvPr>
+          <p:cNvSpPr txBox="1">
+            <a:spLocks/>
           </p:cNvSpPr>
-          <p:nvPr>
-            <p:ph idx="1"/>
-          </p:nvPr>
-        </p:nvSpPr>
-        <p:spPr/>
+          <p:nvPr/>
+        </p:nvSpPr>
+        <p:spPr>
+          <a:xfrm>
+            <a:off x="428172" y="4971142"/>
+            <a:ext cx="5405664" cy="348343"/>
+          </a:xfrm>
+          <a:prstGeom prst="rect">
+            <a:avLst/>
+          </a:prstGeom>
+          <a:ln w="38100">
+            <a:solidFill>
+              <a:schemeClr val="accent1"/>
+            </a:solidFill>
+          </a:ln>
+        </p:spPr>
         <p:txBody>
-          <a:bodyPr>
+          <a:bodyPr vert="horz" lIns="91440" tIns="45720" rIns="91440" bIns="45720" rtlCol="0" anchor="ctr">
             <a:normAutofit/>
           </a:bodyPr>
+          <a:lstStyle>
+            <a:lvl1pPr marL="342900" indent="-342900" algn="l" defTabSz="914400" rtl="0" eaLnBrk="1" latinLnBrk="0" hangingPunct="1">
+              <a:lnSpc>
+                <a:spcPct val="90000"/>
+              </a:lnSpc>
+              <a:spcBef>
+                <a:spcPts val="1000"/>
+              </a:spcBef>
+              <a:buClr>
+                <a:srgbClr val="00B050"/>
+              </a:buClr>
+              <a:buFont typeface="Wingdings" panose="05000000000000000000" pitchFamily="2" charset="2"/>
+              <a:buChar char="Ø"/>
+              <a:defRPr sz="2400" kern="1200">
+                <a:solidFill>
+                  <a:schemeClr val="tx1"/>
+                </a:solidFill>
+                <a:latin typeface="Palatino Linotype" panose="02040502050505030304" pitchFamily="18" charset="0"/>
+                <a:ea typeface="+mn-ea"/>
+                <a:cs typeface="+mn-cs"/>
+              </a:defRPr>
+            </a:lvl1pPr>
+            <a:lvl2pPr marL="685800" indent="-228600" algn="l" defTabSz="914400" rtl="0" eaLnBrk="1" latinLnBrk="0" hangingPunct="1">
+              <a:lnSpc>
+                <a:spcPct val="90000"/>
+              </a:lnSpc>
+              <a:spcBef>
+                <a:spcPts val="500"/>
+              </a:spcBef>
+              <a:buClr>
+                <a:srgbClr val="00B050"/>
+              </a:buClr>
+              <a:buFont typeface="Wingdings" panose="05000000000000000000" pitchFamily="2" charset="2"/>
+              <a:buChar char="§"/>
+              <a:defRPr sz="2000" kern="1200">
+                <a:solidFill>
+                  <a:schemeClr val="tx1"/>
+                </a:solidFill>
+                <a:latin typeface="Palatino Linotype" panose="02040502050505030304" pitchFamily="18" charset="0"/>
+                <a:ea typeface="+mn-ea"/>
+                <a:cs typeface="+mn-cs"/>
+              </a:defRPr>
+            </a:lvl2pPr>
+            <a:lvl3pPr marL="1143000" indent="-228600" algn="l" defTabSz="914400" rtl="0" eaLnBrk="1" latinLnBrk="0" hangingPunct="1">
+              <a:lnSpc>
+                <a:spcPct val="90000"/>
+              </a:lnSpc>
+              <a:spcBef>
+                <a:spcPts val="500"/>
+              </a:spcBef>
+              <a:buClr>
+                <a:srgbClr val="00B050"/>
+              </a:buClr>
+              <a:buFont typeface="Arial" panose="020B0604020202020204" pitchFamily="34" charset="0"/>
+              <a:buChar char="•"/>
+              <a:defRPr sz="1800" kern="1200">
+                <a:solidFill>
+                  <a:schemeClr val="tx1"/>
+                </a:solidFill>
+                <a:latin typeface="Palatino Linotype" panose="02040502050505030304" pitchFamily="18" charset="0"/>
+                <a:ea typeface="+mn-ea"/>
+                <a:cs typeface="+mn-cs"/>
+              </a:defRPr>
+            </a:lvl3pPr>
+            <a:lvl4pPr marL="1600200" indent="-228600" algn="l" defTabSz="914400" rtl="0" eaLnBrk="1" latinLnBrk="0" hangingPunct="1">
+              <a:lnSpc>
+                <a:spcPct val="90000"/>
+              </a:lnSpc>
+              <a:spcBef>
+                <a:spcPts val="500"/>
+              </a:spcBef>
+              <a:buClr>
+                <a:srgbClr val="00B050"/>
+              </a:buClr>
+              <a:buFont typeface="Courier New" panose="02070309020205020404" pitchFamily="49" charset="0"/>
+              <a:buChar char="o"/>
+              <a:defRPr sz="1600" kern="1200">
+                <a:solidFill>
+                  <a:schemeClr val="tx1"/>
+                </a:solidFill>
+                <a:latin typeface="Palatino Linotype" panose="02040502050505030304" pitchFamily="18" charset="0"/>
+                <a:ea typeface="+mn-ea"/>
+                <a:cs typeface="+mn-cs"/>
+              </a:defRPr>
+            </a:lvl4pPr>
+            <a:lvl5pPr marL="2057400" indent="-228600" algn="l" defTabSz="914400" rtl="0" eaLnBrk="1" latinLnBrk="0" hangingPunct="1">
+              <a:lnSpc>
+                <a:spcPct val="90000"/>
+              </a:lnSpc>
+              <a:spcBef>
+                <a:spcPts val="500"/>
+              </a:spcBef>
+              <a:buClr>
+                <a:srgbClr val="00B050"/>
+              </a:buClr>
+              <a:buFont typeface="Times New Roman" panose="02020603050405020304" pitchFamily="18" charset="0"/>
+              <a:buChar char="̶"/>
+              <a:defRPr sz="1600" kern="1200">
+                <a:solidFill>
+                  <a:schemeClr val="tx1"/>
+                </a:solidFill>
+                <a:latin typeface="Palatino Linotype" panose="02040502050505030304" pitchFamily="18" charset="0"/>
+                <a:ea typeface="+mn-ea"/>
+                <a:cs typeface="+mn-cs"/>
+              </a:defRPr>
+            </a:lvl5pPr>
+            <a:lvl6pPr marL="2514600" indent="-228600" algn="l" defTabSz="914400" rtl="0" eaLnBrk="1" latinLnBrk="0" hangingPunct="1">
+              <a:lnSpc>
+                <a:spcPct val="90000"/>
+              </a:lnSpc>
+              <a:spcBef>
+                <a:spcPts val="500"/>
+              </a:spcBef>
+              <a:buFont typeface="Arial" panose="020B0604020202020204" pitchFamily="34" charset="0"/>
+              <a:buChar char="•"/>
+              <a:defRPr sz="1800" kern="1200">
+                <a:solidFill>
+                  <a:schemeClr val="tx1"/>
+                </a:solidFill>
+                <a:latin typeface="+mn-lt"/>
+                <a:ea typeface="+mn-ea"/>
+                <a:cs typeface="+mn-cs"/>
+              </a:defRPr>
+            </a:lvl6pPr>
+            <a:lvl7pPr marL="2971800" indent="-228600" algn="l" defTabSz="914400" rtl="0" eaLnBrk="1" latinLnBrk="0" hangingPunct="1">
+              <a:lnSpc>
+                <a:spcPct val="90000"/>
+              </a:lnSpc>
+              <a:spcBef>
+                <a:spcPts val="500"/>
+              </a:spcBef>
+              <a:buFont typeface="Arial" panose="020B0604020202020204" pitchFamily="34" charset="0"/>
+              <a:buChar char="•"/>
+              <a:defRPr sz="1800" kern="1200">
+                <a:solidFill>
+                  <a:schemeClr val="tx1"/>
+                </a:solidFill>
+                <a:latin typeface="+mn-lt"/>
+                <a:ea typeface="+mn-ea"/>
+                <a:cs typeface="+mn-cs"/>
+              </a:defRPr>
+            </a:lvl7pPr>
+            <a:lvl8pPr marL="3429000" indent="-228600" algn="l" defTabSz="914400" rtl="0" eaLnBrk="1" latinLnBrk="0" hangingPunct="1">
+              <a:lnSpc>
+                <a:spcPct val="90000"/>
+              </a:lnSpc>
+              <a:spcBef>
+                <a:spcPts val="500"/>
+              </a:spcBef>
+              <a:buFont typeface="Arial" panose="020B0604020202020204" pitchFamily="34" charset="0"/>
+              <a:buChar char="•"/>
+              <a:defRPr sz="1800" kern="1200">
+                <a:solidFill>
+                  <a:schemeClr val="tx1"/>
+                </a:solidFill>
+                <a:latin typeface="+mn-lt"/>
+                <a:ea typeface="+mn-ea"/>
+                <a:cs typeface="+mn-cs"/>
+              </a:defRPr>
+            </a:lvl8pPr>
+            <a:lvl9pPr marL="3886200" indent="-228600" algn="l" defTabSz="914400" rtl="0" eaLnBrk="1" latinLnBrk="0" hangingPunct="1">
+              <a:lnSpc>
+                <a:spcPct val="90000"/>
+              </a:lnSpc>
+              <a:spcBef>
+                <a:spcPts val="500"/>
+              </a:spcBef>
+              <a:buFont typeface="Arial" panose="020B0604020202020204" pitchFamily="34" charset="0"/>
+              <a:buChar char="•"/>
+              <a:defRPr sz="1800" kern="1200">
+                <a:solidFill>
+                  <a:schemeClr val="tx1"/>
+                </a:solidFill>
+                <a:latin typeface="+mn-lt"/>
+                <a:ea typeface="+mn-ea"/>
+                <a:cs typeface="+mn-cs"/>
+              </a:defRPr>
+            </a:lvl9pPr>
+          </a:lstStyle>
+          <a:p>
+            <a:pPr marL="0" indent="0" algn="r">
+              <a:buNone/>
+            </a:pPr>
+            <a:r>
+              <a:rPr lang="en-GB" sz="1600" b="1" dirty="0"/>
+              <a:t>Milestone #1</a:t>
+            </a:r>
+          </a:p>
+        </p:txBody>
+      </p:sp>
+      <p:sp>
+        <p:nvSpPr>
+          <p:cNvPr id="26" name="Content Placeholder 2">
+            <a:extLst>
+              <a:ext uri="{FF2B5EF4-FFF2-40B4-BE49-F238E27FC236}">
+                <a16:creationId xmlns:a16="http://schemas.microsoft.com/office/drawing/2014/main" id="{2727A7E2-5907-244F-9EA4-6EB7B1B78FC4}"/>
+              </a:ext>
+            </a:extLst>
+          </p:cNvPr>
+          <p:cNvSpPr txBox="1">
+            <a:spLocks/>
+          </p:cNvSpPr>
+          <p:nvPr/>
+        </p:nvSpPr>
+        <p:spPr>
+          <a:xfrm>
+            <a:off x="6273451" y="4971142"/>
+            <a:ext cx="2600224" cy="360748"/>
+          </a:xfrm>
+          <a:prstGeom prst="rect">
+            <a:avLst/>
+          </a:prstGeom>
+          <a:ln w="38100">
+            <a:solidFill>
+              <a:srgbClr val="FFC000"/>
+            </a:solidFill>
+          </a:ln>
+        </p:spPr>
+        <p:txBody>
+          <a:bodyPr vert="horz" lIns="91440" tIns="45720" rIns="91440" bIns="45720" rtlCol="0" anchor="ctr">
+            <a:normAutofit/>
+          </a:bodyPr>
+          <a:lstStyle>
+            <a:lvl1pPr marL="342900" indent="-342900" algn="l" defTabSz="914400" rtl="0" eaLnBrk="1" latinLnBrk="0" hangingPunct="1">
+              <a:lnSpc>
+                <a:spcPct val="90000"/>
+              </a:lnSpc>
+              <a:spcBef>
+                <a:spcPts val="1000"/>
+              </a:spcBef>
+              <a:buClr>
+                <a:srgbClr val="00B050"/>
+              </a:buClr>
+              <a:buFont typeface="Wingdings" panose="05000000000000000000" pitchFamily="2" charset="2"/>
+              <a:buChar char="Ø"/>
+              <a:defRPr sz="2400" kern="1200">
+                <a:solidFill>
+                  <a:schemeClr val="tx1"/>
+                </a:solidFill>
+                <a:latin typeface="Palatino Linotype" panose="02040502050505030304" pitchFamily="18" charset="0"/>
+                <a:ea typeface="+mn-ea"/>
+                <a:cs typeface="+mn-cs"/>
+              </a:defRPr>
+            </a:lvl1pPr>
+            <a:lvl2pPr marL="685800" indent="-228600" algn="l" defTabSz="914400" rtl="0" eaLnBrk="1" latinLnBrk="0" hangingPunct="1">
+              <a:lnSpc>
+                <a:spcPct val="90000"/>
+              </a:lnSpc>
+              <a:spcBef>
+                <a:spcPts val="500"/>
+              </a:spcBef>
+              <a:buClr>
+                <a:srgbClr val="00B050"/>
+              </a:buClr>
+              <a:buFont typeface="Wingdings" panose="05000000000000000000" pitchFamily="2" charset="2"/>
+              <a:buChar char="§"/>
+              <a:defRPr sz="2000" kern="1200">
+                <a:solidFill>
+                  <a:schemeClr val="tx1"/>
+                </a:solidFill>
+                <a:latin typeface="Palatino Linotype" panose="02040502050505030304" pitchFamily="18" charset="0"/>
+                <a:ea typeface="+mn-ea"/>
+                <a:cs typeface="+mn-cs"/>
+              </a:defRPr>
+            </a:lvl2pPr>
+            <a:lvl3pPr marL="1143000" indent="-228600" algn="l" defTabSz="914400" rtl="0" eaLnBrk="1" latinLnBrk="0" hangingPunct="1">
+              <a:lnSpc>
+                <a:spcPct val="90000"/>
+              </a:lnSpc>
+              <a:spcBef>
+                <a:spcPts val="500"/>
+              </a:spcBef>
+              <a:buClr>
+                <a:srgbClr val="00B050"/>
+              </a:buClr>
+              <a:buFont typeface="Arial" panose="020B0604020202020204" pitchFamily="34" charset="0"/>
+              <a:buChar char="•"/>
+              <a:defRPr sz="1800" kern="1200">
+                <a:solidFill>
+                  <a:schemeClr val="tx1"/>
+                </a:solidFill>
+                <a:latin typeface="Palatino Linotype" panose="02040502050505030304" pitchFamily="18" charset="0"/>
+                <a:ea typeface="+mn-ea"/>
+                <a:cs typeface="+mn-cs"/>
+              </a:defRPr>
+            </a:lvl3pPr>
+            <a:lvl4pPr marL="1600200" indent="-228600" algn="l" defTabSz="914400" rtl="0" eaLnBrk="1" latinLnBrk="0" hangingPunct="1">
+              <a:lnSpc>
+                <a:spcPct val="90000"/>
+              </a:lnSpc>
+              <a:spcBef>
+                <a:spcPts val="500"/>
+              </a:spcBef>
+              <a:buClr>
+                <a:srgbClr val="00B050"/>
+              </a:buClr>
+              <a:buFont typeface="Courier New" panose="02070309020205020404" pitchFamily="49" charset="0"/>
+              <a:buChar char="o"/>
+              <a:defRPr sz="1600" kern="1200">
+                <a:solidFill>
+                  <a:schemeClr val="tx1"/>
+                </a:solidFill>
+                <a:latin typeface="Palatino Linotype" panose="02040502050505030304" pitchFamily="18" charset="0"/>
+                <a:ea typeface="+mn-ea"/>
+                <a:cs typeface="+mn-cs"/>
+              </a:defRPr>
+            </a:lvl4pPr>
+            <a:lvl5pPr marL="2057400" indent="-228600" algn="l" defTabSz="914400" rtl="0" eaLnBrk="1" latinLnBrk="0" hangingPunct="1">
+              <a:lnSpc>
+                <a:spcPct val="90000"/>
+              </a:lnSpc>
+              <a:spcBef>
+                <a:spcPts val="500"/>
+              </a:spcBef>
+              <a:buClr>
+                <a:srgbClr val="00B050"/>
+              </a:buClr>
+              <a:buFont typeface="Times New Roman" panose="02020603050405020304" pitchFamily="18" charset="0"/>
+              <a:buChar char="̶"/>
+              <a:defRPr sz="1600" kern="1200">
+                <a:solidFill>
+                  <a:schemeClr val="tx1"/>
+                </a:solidFill>
+                <a:latin typeface="Palatino Linotype" panose="02040502050505030304" pitchFamily="18" charset="0"/>
+                <a:ea typeface="+mn-ea"/>
+                <a:cs typeface="+mn-cs"/>
+              </a:defRPr>
+            </a:lvl5pPr>
+            <a:lvl6pPr marL="2514600" indent="-228600" algn="l" defTabSz="914400" rtl="0" eaLnBrk="1" latinLnBrk="0" hangingPunct="1">
+              <a:lnSpc>
+                <a:spcPct val="90000"/>
+              </a:lnSpc>
+              <a:spcBef>
+                <a:spcPts val="500"/>
+              </a:spcBef>
+              <a:buFont typeface="Arial" panose="020B0604020202020204" pitchFamily="34" charset="0"/>
+              <a:buChar char="•"/>
+              <a:defRPr sz="1800" kern="1200">
+                <a:solidFill>
+                  <a:schemeClr val="tx1"/>
+                </a:solidFill>
+                <a:latin typeface="+mn-lt"/>
+                <a:ea typeface="+mn-ea"/>
+                <a:cs typeface="+mn-cs"/>
+              </a:defRPr>
+            </a:lvl6pPr>
+            <a:lvl7pPr marL="2971800" indent="-228600" algn="l" defTabSz="914400" rtl="0" eaLnBrk="1" latinLnBrk="0" hangingPunct="1">
+              <a:lnSpc>
+                <a:spcPct val="90000"/>
+              </a:lnSpc>
+              <a:spcBef>
+                <a:spcPts val="500"/>
+              </a:spcBef>
+              <a:buFont typeface="Arial" panose="020B0604020202020204" pitchFamily="34" charset="0"/>
+              <a:buChar char="•"/>
+              <a:defRPr sz="1800" kern="1200">
+                <a:solidFill>
+                  <a:schemeClr val="tx1"/>
+                </a:solidFill>
+                <a:latin typeface="+mn-lt"/>
+                <a:ea typeface="+mn-ea"/>
+                <a:cs typeface="+mn-cs"/>
+              </a:defRPr>
+            </a:lvl7pPr>
+            <a:lvl8pPr marL="3429000" indent="-228600" algn="l" defTabSz="914400" rtl="0" eaLnBrk="1" latinLnBrk="0" hangingPunct="1">
+              <a:lnSpc>
+                <a:spcPct val="90000"/>
+              </a:lnSpc>
+              <a:spcBef>
+                <a:spcPts val="500"/>
+              </a:spcBef>
+              <a:buFont typeface="Arial" panose="020B0604020202020204" pitchFamily="34" charset="0"/>
+              <a:buChar char="•"/>
+              <a:defRPr sz="1800" kern="1200">
+                <a:solidFill>
+                  <a:schemeClr val="tx1"/>
+                </a:solidFill>
+                <a:latin typeface="+mn-lt"/>
+                <a:ea typeface="+mn-ea"/>
+                <a:cs typeface="+mn-cs"/>
+              </a:defRPr>
+            </a:lvl8pPr>
+            <a:lvl9pPr marL="3886200" indent="-228600" algn="l" defTabSz="914400" rtl="0" eaLnBrk="1" latinLnBrk="0" hangingPunct="1">
+              <a:lnSpc>
+                <a:spcPct val="90000"/>
+              </a:lnSpc>
+              <a:spcBef>
+                <a:spcPts val="500"/>
+              </a:spcBef>
+              <a:buFont typeface="Arial" panose="020B0604020202020204" pitchFamily="34" charset="0"/>
+              <a:buChar char="•"/>
+              <a:defRPr sz="1800" kern="1200">
+                <a:solidFill>
+                  <a:schemeClr val="tx1"/>
+                </a:solidFill>
+                <a:latin typeface="+mn-lt"/>
+                <a:ea typeface="+mn-ea"/>
+                <a:cs typeface="+mn-cs"/>
+              </a:defRPr>
+            </a:lvl9pPr>
+          </a:lstStyle>
+          <a:p>
+            <a:pPr marL="0" indent="0" algn="r">
+              <a:buNone/>
+            </a:pPr>
+            <a:r>
+              <a:rPr lang="en-GB" sz="1600" b="1" dirty="0"/>
+              <a:t>Milestone #2</a:t>
+            </a:r>
+          </a:p>
+        </p:txBody>
+      </p:sp>
+      <p:sp>
+        <p:nvSpPr>
+          <p:cNvPr id="27" name="Content Placeholder 2">
+            <a:extLst>
+              <a:ext uri="{FF2B5EF4-FFF2-40B4-BE49-F238E27FC236}">
+                <a16:creationId xmlns:a16="http://schemas.microsoft.com/office/drawing/2014/main" id="{097F527A-6D86-4B4B-8507-E05C41EE2643}"/>
+              </a:ext>
+            </a:extLst>
+          </p:cNvPr>
+          <p:cNvSpPr txBox="1">
+            <a:spLocks/>
+          </p:cNvSpPr>
+          <p:nvPr/>
+        </p:nvSpPr>
+        <p:spPr>
+          <a:xfrm>
+            <a:off x="9304006" y="4971141"/>
+            <a:ext cx="2571736" cy="348343"/>
+          </a:xfrm>
+          <a:prstGeom prst="rect">
+            <a:avLst/>
+          </a:prstGeom>
+          <a:ln w="38100">
+            <a:solidFill>
+              <a:srgbClr val="7030A0"/>
+            </a:solidFill>
+          </a:ln>
+        </p:spPr>
+        <p:txBody>
+          <a:bodyPr vert="horz" lIns="91440" tIns="45720" rIns="91440" bIns="45720" rtlCol="0" anchor="ctr">
+            <a:normAutofit/>
+          </a:bodyPr>
+          <a:lstStyle>
+            <a:lvl1pPr marL="342900" indent="-342900" algn="l" defTabSz="914400" rtl="0" eaLnBrk="1" latinLnBrk="0" hangingPunct="1">
+              <a:lnSpc>
+                <a:spcPct val="90000"/>
+              </a:lnSpc>
+              <a:spcBef>
+                <a:spcPts val="1000"/>
+              </a:spcBef>
+              <a:buClr>
+                <a:srgbClr val="00B050"/>
+              </a:buClr>
+              <a:buFont typeface="Wingdings" panose="05000000000000000000" pitchFamily="2" charset="2"/>
+              <a:buChar char="Ø"/>
+              <a:defRPr sz="2400" kern="1200">
+                <a:solidFill>
+                  <a:schemeClr val="tx1"/>
+                </a:solidFill>
+                <a:latin typeface="Palatino Linotype" panose="02040502050505030304" pitchFamily="18" charset="0"/>
+                <a:ea typeface="+mn-ea"/>
+                <a:cs typeface="+mn-cs"/>
+              </a:defRPr>
+            </a:lvl1pPr>
+            <a:lvl2pPr marL="685800" indent="-228600" algn="l" defTabSz="914400" rtl="0" eaLnBrk="1" latinLnBrk="0" hangingPunct="1">
+              <a:lnSpc>
+                <a:spcPct val="90000"/>
+              </a:lnSpc>
+              <a:spcBef>
+                <a:spcPts val="500"/>
+              </a:spcBef>
+              <a:buClr>
+                <a:srgbClr val="00B050"/>
+              </a:buClr>
+              <a:buFont typeface="Wingdings" panose="05000000000000000000" pitchFamily="2" charset="2"/>
+              <a:buChar char="§"/>
+              <a:defRPr sz="2000" kern="1200">
+                <a:solidFill>
+                  <a:schemeClr val="tx1"/>
+                </a:solidFill>
+                <a:latin typeface="Palatino Linotype" panose="02040502050505030304" pitchFamily="18" charset="0"/>
+                <a:ea typeface="+mn-ea"/>
+                <a:cs typeface="+mn-cs"/>
+              </a:defRPr>
+            </a:lvl2pPr>
+            <a:lvl3pPr marL="1143000" indent="-228600" algn="l" defTabSz="914400" rtl="0" eaLnBrk="1" latinLnBrk="0" hangingPunct="1">
+              <a:lnSpc>
+                <a:spcPct val="90000"/>
+              </a:lnSpc>
+              <a:spcBef>
+                <a:spcPts val="500"/>
+              </a:spcBef>
+              <a:buClr>
+                <a:srgbClr val="00B050"/>
+              </a:buClr>
+              <a:buFont typeface="Arial" panose="020B0604020202020204" pitchFamily="34" charset="0"/>
+              <a:buChar char="•"/>
+              <a:defRPr sz="1800" kern="1200">
+                <a:solidFill>
+                  <a:schemeClr val="tx1"/>
+                </a:solidFill>
+                <a:latin typeface="Palatino Linotype" panose="02040502050505030304" pitchFamily="18" charset="0"/>
+                <a:ea typeface="+mn-ea"/>
+                <a:cs typeface="+mn-cs"/>
+              </a:defRPr>
+            </a:lvl3pPr>
+            <a:lvl4pPr marL="1600200" indent="-228600" algn="l" defTabSz="914400" rtl="0" eaLnBrk="1" latinLnBrk="0" hangingPunct="1">
+              <a:lnSpc>
+                <a:spcPct val="90000"/>
+              </a:lnSpc>
+              <a:spcBef>
+                <a:spcPts val="500"/>
+              </a:spcBef>
+              <a:buClr>
+                <a:srgbClr val="00B050"/>
+              </a:buClr>
+              <a:buFont typeface="Courier New" panose="02070309020205020404" pitchFamily="49" charset="0"/>
+              <a:buChar char="o"/>
+              <a:defRPr sz="1600" kern="1200">
+                <a:solidFill>
+                  <a:schemeClr val="tx1"/>
+                </a:solidFill>
+                <a:latin typeface="Palatino Linotype" panose="02040502050505030304" pitchFamily="18" charset="0"/>
+                <a:ea typeface="+mn-ea"/>
+                <a:cs typeface="+mn-cs"/>
+              </a:defRPr>
+            </a:lvl4pPr>
+            <a:lvl5pPr marL="2057400" indent="-228600" algn="l" defTabSz="914400" rtl="0" eaLnBrk="1" latinLnBrk="0" hangingPunct="1">
+              <a:lnSpc>
+                <a:spcPct val="90000"/>
+              </a:lnSpc>
+              <a:spcBef>
+                <a:spcPts val="500"/>
+              </a:spcBef>
+              <a:buClr>
+                <a:srgbClr val="00B050"/>
+              </a:buClr>
+              <a:buFont typeface="Times New Roman" panose="02020603050405020304" pitchFamily="18" charset="0"/>
+              <a:buChar char="̶"/>
+              <a:defRPr sz="1600" kern="1200">
+                <a:solidFill>
+                  <a:schemeClr val="tx1"/>
+                </a:solidFill>
+                <a:latin typeface="Palatino Linotype" panose="02040502050505030304" pitchFamily="18" charset="0"/>
+                <a:ea typeface="+mn-ea"/>
+                <a:cs typeface="+mn-cs"/>
+              </a:defRPr>
+            </a:lvl5pPr>
+            <a:lvl6pPr marL="2514600" indent="-228600" algn="l" defTabSz="914400" rtl="0" eaLnBrk="1" latinLnBrk="0" hangingPunct="1">
+              <a:lnSpc>
+                <a:spcPct val="90000"/>
+              </a:lnSpc>
+              <a:spcBef>
+                <a:spcPts val="500"/>
+              </a:spcBef>
+              <a:buFont typeface="Arial" panose="020B0604020202020204" pitchFamily="34" charset="0"/>
+              <a:buChar char="•"/>
+              <a:defRPr sz="1800" kern="1200">
+                <a:solidFill>
+                  <a:schemeClr val="tx1"/>
+                </a:solidFill>
+                <a:latin typeface="+mn-lt"/>
+                <a:ea typeface="+mn-ea"/>
+                <a:cs typeface="+mn-cs"/>
+              </a:defRPr>
+            </a:lvl6pPr>
+            <a:lvl7pPr marL="2971800" indent="-228600" algn="l" defTabSz="914400" rtl="0" eaLnBrk="1" latinLnBrk="0" hangingPunct="1">
+              <a:lnSpc>
+                <a:spcPct val="90000"/>
+              </a:lnSpc>
+              <a:spcBef>
+                <a:spcPts val="500"/>
+              </a:spcBef>
+              <a:buFont typeface="Arial" panose="020B0604020202020204" pitchFamily="34" charset="0"/>
+              <a:buChar char="•"/>
+              <a:defRPr sz="1800" kern="1200">
+                <a:solidFill>
+                  <a:schemeClr val="tx1"/>
+                </a:solidFill>
+                <a:latin typeface="+mn-lt"/>
+                <a:ea typeface="+mn-ea"/>
+                <a:cs typeface="+mn-cs"/>
+              </a:defRPr>
+            </a:lvl7pPr>
+            <a:lvl8pPr marL="3429000" indent="-228600" algn="l" defTabSz="914400" rtl="0" eaLnBrk="1" latinLnBrk="0" hangingPunct="1">
+              <a:lnSpc>
+                <a:spcPct val="90000"/>
+              </a:lnSpc>
+              <a:spcBef>
+                <a:spcPts val="500"/>
+              </a:spcBef>
+              <a:buFont typeface="Arial" panose="020B0604020202020204" pitchFamily="34" charset="0"/>
+              <a:buChar char="•"/>
+              <a:defRPr sz="1800" kern="1200">
+                <a:solidFill>
+                  <a:schemeClr val="tx1"/>
+                </a:solidFill>
+                <a:latin typeface="+mn-lt"/>
+                <a:ea typeface="+mn-ea"/>
+                <a:cs typeface="+mn-cs"/>
+              </a:defRPr>
+            </a:lvl8pPr>
+            <a:lvl9pPr marL="3886200" indent="-228600" algn="l" defTabSz="914400" rtl="0" eaLnBrk="1" latinLnBrk="0" hangingPunct="1">
+              <a:lnSpc>
+                <a:spcPct val="90000"/>
+              </a:lnSpc>
+              <a:spcBef>
+                <a:spcPts val="500"/>
+              </a:spcBef>
+              <a:buFont typeface="Arial" panose="020B0604020202020204" pitchFamily="34" charset="0"/>
+              <a:buChar char="•"/>
+              <a:defRPr sz="1800" kern="1200">
+                <a:solidFill>
+                  <a:schemeClr val="tx1"/>
+                </a:solidFill>
+                <a:latin typeface="+mn-lt"/>
+                <a:ea typeface="+mn-ea"/>
+                <a:cs typeface="+mn-cs"/>
+              </a:defRPr>
+            </a:lvl9pPr>
+          </a:lstStyle>
+          <a:p>
+            <a:pPr marL="0" indent="0" algn="r">
+              <a:buNone/>
+            </a:pPr>
+            <a:r>
+              <a:rPr lang="en-GB" sz="1600" b="1" dirty="0"/>
+              <a:t>Milestone #3</a:t>
+            </a:r>
+          </a:p>
+        </p:txBody>
+      </p:sp>
+      <p:sp>
+        <p:nvSpPr>
+          <p:cNvPr id="33" name="Rectangle 32">
+            <a:extLst>
+              <a:ext uri="{FF2B5EF4-FFF2-40B4-BE49-F238E27FC236}">
+                <a16:creationId xmlns:a16="http://schemas.microsoft.com/office/drawing/2014/main" id="{0A0D4DC1-5C18-7F46-8370-E7C962DEF38F}"/>
+              </a:ext>
+            </a:extLst>
+          </p:cNvPr>
+          <p:cNvSpPr/>
+          <p:nvPr/>
+        </p:nvSpPr>
+        <p:spPr>
+          <a:xfrm>
+            <a:off x="428172" y="1209985"/>
+            <a:ext cx="913817" cy="300148"/>
+          </a:xfrm>
+          <a:prstGeom prst="rect">
+            <a:avLst/>
+          </a:prstGeom>
+          <a:ln w="38100">
+            <a:solidFill>
+              <a:schemeClr val="accent1"/>
+            </a:solidFill>
+          </a:ln>
+        </p:spPr>
+        <p:style>
+          <a:lnRef idx="2">
+            <a:schemeClr val="accent6"/>
+          </a:lnRef>
+          <a:fillRef idx="1">
+            <a:schemeClr val="lt1"/>
+          </a:fillRef>
+          <a:effectRef idx="0">
+            <a:schemeClr val="accent6"/>
+          </a:effectRef>
+          <a:fontRef idx="minor">
+            <a:schemeClr val="dk1"/>
+          </a:fontRef>
+        </p:style>
+        <p:txBody>
+          <a:bodyPr rtlCol="0" anchor="ctr"/>
           <a:lstStyle/>
           <a:p>
-            <a:r>
-              <a:rPr lang="en-IT" b="1" dirty="0"/>
-              <a:t>Recap</a:t>
-            </a:r>
-          </a:p>
-          <a:p>
+            <a:pPr algn="ctr"/>
+            <a:r>
+              <a:rPr lang="en-IT" sz="1200" dirty="0">
+                <a:latin typeface="Palatino Linotype" panose="02040502050505030304" pitchFamily="18" charset="0"/>
+              </a:rPr>
+              <a:t>Lesson 1</a:t>
+            </a:r>
+          </a:p>
+        </p:txBody>
+      </p:sp>
+      <p:sp>
+        <p:nvSpPr>
+          <p:cNvPr id="34" name="Rectangle 33">
+            <a:extLst>
+              <a:ext uri="{FF2B5EF4-FFF2-40B4-BE49-F238E27FC236}">
+                <a16:creationId xmlns:a16="http://schemas.microsoft.com/office/drawing/2014/main" id="{42637D9E-30CA-E84B-801A-C532883DD90D}"/>
+              </a:ext>
+            </a:extLst>
+          </p:cNvPr>
+          <p:cNvSpPr/>
+          <p:nvPr/>
+        </p:nvSpPr>
+        <p:spPr>
+          <a:xfrm>
+            <a:off x="428173" y="2455130"/>
+            <a:ext cx="913832" cy="300148"/>
+          </a:xfrm>
+          <a:prstGeom prst="rect">
+            <a:avLst/>
+          </a:prstGeom>
+          <a:solidFill>
+            <a:srgbClr val="FFFF00"/>
+          </a:solidFill>
+          <a:ln w="38100">
+            <a:solidFill>
+              <a:schemeClr val="accent1"/>
+            </a:solidFill>
+          </a:ln>
+        </p:spPr>
+        <p:style>
+          <a:lnRef idx="2">
+            <a:schemeClr val="accent6"/>
+          </a:lnRef>
+          <a:fillRef idx="1">
+            <a:schemeClr val="lt1"/>
+          </a:fillRef>
+          <a:effectRef idx="0">
+            <a:schemeClr val="accent6"/>
+          </a:effectRef>
+          <a:fontRef idx="minor">
+            <a:schemeClr val="dk1"/>
+          </a:fontRef>
+        </p:style>
+        <p:txBody>
+          <a:bodyPr rtlCol="0" anchor="ctr"/>
+          <a:lstStyle/>
+          <a:p>
+            <a:pPr algn="ctr"/>
+            <a:r>
+              <a:rPr lang="en-IT" sz="1200" dirty="0">
+                <a:latin typeface="Palatino Linotype" panose="02040502050505030304" pitchFamily="18" charset="0"/>
+              </a:rPr>
+              <a:t>Lesson 2/3</a:t>
+            </a:r>
+          </a:p>
+        </p:txBody>
+      </p:sp>
+      <p:sp>
+        <p:nvSpPr>
+          <p:cNvPr id="35" name="Rectangle 34">
+            <a:extLst>
+              <a:ext uri="{FF2B5EF4-FFF2-40B4-BE49-F238E27FC236}">
+                <a16:creationId xmlns:a16="http://schemas.microsoft.com/office/drawing/2014/main" id="{C6E7C382-226C-FA46-8DB3-6D1900A47C91}"/>
+              </a:ext>
+            </a:extLst>
+          </p:cNvPr>
+          <p:cNvSpPr/>
+          <p:nvPr/>
+        </p:nvSpPr>
+        <p:spPr>
+          <a:xfrm>
+            <a:off x="428173" y="3696156"/>
+            <a:ext cx="877080" cy="300148"/>
+          </a:xfrm>
+          <a:prstGeom prst="rect">
+            <a:avLst/>
+          </a:prstGeom>
+          <a:ln w="38100">
+            <a:solidFill>
+              <a:schemeClr val="accent1"/>
+            </a:solidFill>
+          </a:ln>
+        </p:spPr>
+        <p:style>
+          <a:lnRef idx="2">
+            <a:schemeClr val="accent6"/>
+          </a:lnRef>
+          <a:fillRef idx="1">
+            <a:schemeClr val="lt1"/>
+          </a:fillRef>
+          <a:effectRef idx="0">
+            <a:schemeClr val="accent6"/>
+          </a:effectRef>
+          <a:fontRef idx="minor">
+            <a:schemeClr val="dk1"/>
+          </a:fontRef>
+        </p:style>
+        <p:txBody>
+          <a:bodyPr rtlCol="0" anchor="ctr"/>
+          <a:lstStyle/>
+          <a:p>
+            <a:pPr algn="ctr"/>
+            <a:r>
+              <a:rPr lang="en-IT" sz="1200" dirty="0">
+                <a:latin typeface="Palatino Linotype" panose="02040502050505030304" pitchFamily="18" charset="0"/>
+              </a:rPr>
+              <a:t>Lesson 4</a:t>
+            </a:r>
+          </a:p>
+        </p:txBody>
+      </p:sp>
+      <p:sp>
+        <p:nvSpPr>
+          <p:cNvPr id="36" name="Rectangle 35">
+            <a:extLst>
+              <a:ext uri="{FF2B5EF4-FFF2-40B4-BE49-F238E27FC236}">
+                <a16:creationId xmlns:a16="http://schemas.microsoft.com/office/drawing/2014/main" id="{7EFB24BA-496D-0646-B792-701E8EF31927}"/>
+              </a:ext>
+            </a:extLst>
+          </p:cNvPr>
+          <p:cNvSpPr/>
+          <p:nvPr/>
+        </p:nvSpPr>
+        <p:spPr>
+          <a:xfrm>
+            <a:off x="3264544" y="1207068"/>
+            <a:ext cx="877080" cy="300148"/>
+          </a:xfrm>
+          <a:prstGeom prst="rect">
+            <a:avLst/>
+          </a:prstGeom>
+          <a:noFill/>
+          <a:ln w="38100">
+            <a:solidFill>
+              <a:schemeClr val="accent1"/>
+            </a:solidFill>
+          </a:ln>
+        </p:spPr>
+        <p:style>
+          <a:lnRef idx="2">
+            <a:schemeClr val="accent6"/>
+          </a:lnRef>
+          <a:fillRef idx="1">
+            <a:schemeClr val="lt1"/>
+          </a:fillRef>
+          <a:effectRef idx="0">
+            <a:schemeClr val="accent6"/>
+          </a:effectRef>
+          <a:fontRef idx="minor">
+            <a:schemeClr val="dk1"/>
+          </a:fontRef>
+        </p:style>
+        <p:txBody>
+          <a:bodyPr rtlCol="0" anchor="ctr"/>
+          <a:lstStyle/>
+          <a:p>
+            <a:pPr algn="ctr"/>
+            <a:r>
+              <a:rPr lang="en-IT" sz="1200" dirty="0">
+                <a:latin typeface="Palatino Linotype" panose="02040502050505030304" pitchFamily="18" charset="0"/>
+              </a:rPr>
+              <a:t>Lesson 5</a:t>
+            </a:r>
+          </a:p>
+        </p:txBody>
+      </p:sp>
+      <p:sp>
+        <p:nvSpPr>
+          <p:cNvPr id="37" name="Rectangle 36">
+            <a:extLst>
+              <a:ext uri="{FF2B5EF4-FFF2-40B4-BE49-F238E27FC236}">
+                <a16:creationId xmlns:a16="http://schemas.microsoft.com/office/drawing/2014/main" id="{B92D3ECA-27A3-E346-97B6-6DED991CCB03}"/>
+              </a:ext>
+            </a:extLst>
+          </p:cNvPr>
+          <p:cNvSpPr/>
+          <p:nvPr/>
+        </p:nvSpPr>
+        <p:spPr>
+          <a:xfrm>
+            <a:off x="3264544" y="2452279"/>
+            <a:ext cx="877080" cy="300148"/>
+          </a:xfrm>
+          <a:prstGeom prst="rect">
+            <a:avLst/>
+          </a:prstGeom>
+          <a:ln w="38100">
+            <a:solidFill>
+              <a:schemeClr val="accent1"/>
+            </a:solidFill>
+          </a:ln>
+        </p:spPr>
+        <p:style>
+          <a:lnRef idx="2">
+            <a:schemeClr val="accent6"/>
+          </a:lnRef>
+          <a:fillRef idx="1">
+            <a:schemeClr val="lt1"/>
+          </a:fillRef>
+          <a:effectRef idx="0">
+            <a:schemeClr val="accent6"/>
+          </a:effectRef>
+          <a:fontRef idx="minor">
+            <a:schemeClr val="dk1"/>
+          </a:fontRef>
+        </p:style>
+        <p:txBody>
+          <a:bodyPr rtlCol="0" anchor="ctr"/>
+          <a:lstStyle/>
+          <a:p>
+            <a:pPr algn="ctr"/>
+            <a:r>
+              <a:rPr lang="en-IT" sz="1200" dirty="0">
+                <a:latin typeface="Palatino Linotype" panose="02040502050505030304" pitchFamily="18" charset="0"/>
+              </a:rPr>
+              <a:t>Lesson 6</a:t>
+            </a:r>
+          </a:p>
+        </p:txBody>
+      </p:sp>
+      <p:sp>
+        <p:nvSpPr>
+          <p:cNvPr id="38" name="Rectangle 37">
+            <a:extLst>
+              <a:ext uri="{FF2B5EF4-FFF2-40B4-BE49-F238E27FC236}">
+                <a16:creationId xmlns:a16="http://schemas.microsoft.com/office/drawing/2014/main" id="{0F1FD419-5760-AA40-96E5-CCCF7F0EAF09}"/>
+              </a:ext>
+            </a:extLst>
+          </p:cNvPr>
+          <p:cNvSpPr/>
+          <p:nvPr/>
+        </p:nvSpPr>
+        <p:spPr>
+          <a:xfrm>
+            <a:off x="3264544" y="3705012"/>
+            <a:ext cx="877080" cy="300148"/>
+          </a:xfrm>
+          <a:prstGeom prst="rect">
+            <a:avLst/>
+          </a:prstGeom>
+          <a:ln w="38100">
+            <a:solidFill>
+              <a:schemeClr val="accent1"/>
+            </a:solidFill>
+          </a:ln>
+        </p:spPr>
+        <p:style>
+          <a:lnRef idx="2">
+            <a:schemeClr val="accent6"/>
+          </a:lnRef>
+          <a:fillRef idx="1">
+            <a:schemeClr val="lt1"/>
+          </a:fillRef>
+          <a:effectRef idx="0">
+            <a:schemeClr val="accent6"/>
+          </a:effectRef>
+          <a:fontRef idx="minor">
+            <a:schemeClr val="dk1"/>
+          </a:fontRef>
+        </p:style>
+        <p:txBody>
+          <a:bodyPr rtlCol="0" anchor="ctr"/>
+          <a:lstStyle/>
+          <a:p>
+            <a:pPr algn="ctr"/>
+            <a:r>
+              <a:rPr lang="en-IT" sz="1200" dirty="0">
+                <a:latin typeface="Palatino Linotype" panose="02040502050505030304" pitchFamily="18" charset="0"/>
+              </a:rPr>
+              <a:t>Lesson 7</a:t>
+            </a:r>
+          </a:p>
+        </p:txBody>
+      </p:sp>
+      <p:sp>
+        <p:nvSpPr>
+          <p:cNvPr id="39" name="Rectangle 38">
+            <a:extLst>
+              <a:ext uri="{FF2B5EF4-FFF2-40B4-BE49-F238E27FC236}">
+                <a16:creationId xmlns:a16="http://schemas.microsoft.com/office/drawing/2014/main" id="{7EBBB248-D357-7143-AFFA-BE798B402DB1}"/>
+              </a:ext>
+            </a:extLst>
+          </p:cNvPr>
+          <p:cNvSpPr/>
+          <p:nvPr/>
+        </p:nvSpPr>
+        <p:spPr>
+          <a:xfrm>
+            <a:off x="6300635" y="1203104"/>
+            <a:ext cx="877080" cy="300148"/>
+          </a:xfrm>
+          <a:prstGeom prst="rect">
+            <a:avLst/>
+          </a:prstGeom>
+          <a:noFill/>
+          <a:ln w="38100">
+            <a:solidFill>
+              <a:srgbClr val="FFC000"/>
+            </a:solidFill>
+          </a:ln>
+        </p:spPr>
+        <p:style>
+          <a:lnRef idx="2">
+            <a:schemeClr val="accent6"/>
+          </a:lnRef>
+          <a:fillRef idx="1">
+            <a:schemeClr val="lt1"/>
+          </a:fillRef>
+          <a:effectRef idx="0">
+            <a:schemeClr val="accent6"/>
+          </a:effectRef>
+          <a:fontRef idx="minor">
+            <a:schemeClr val="dk1"/>
+          </a:fontRef>
+        </p:style>
+        <p:txBody>
+          <a:bodyPr rtlCol="0" anchor="ctr"/>
+          <a:lstStyle/>
+          <a:p>
+            <a:pPr algn="ctr"/>
+            <a:r>
+              <a:rPr lang="en-IT" sz="1200" dirty="0">
+                <a:latin typeface="Palatino Linotype" panose="02040502050505030304" pitchFamily="18" charset="0"/>
+              </a:rPr>
+              <a:t>Lesson 8</a:t>
+            </a:r>
+          </a:p>
+        </p:txBody>
+      </p:sp>
+      <p:sp>
+        <p:nvSpPr>
+          <p:cNvPr id="41" name="Rectangle 40">
+            <a:extLst>
+              <a:ext uri="{FF2B5EF4-FFF2-40B4-BE49-F238E27FC236}">
+                <a16:creationId xmlns:a16="http://schemas.microsoft.com/office/drawing/2014/main" id="{68E15202-D95C-2547-87CD-CC21A871EF0B}"/>
+              </a:ext>
+            </a:extLst>
+          </p:cNvPr>
+          <p:cNvSpPr/>
+          <p:nvPr/>
+        </p:nvSpPr>
+        <p:spPr>
+          <a:xfrm>
+            <a:off x="6287293" y="2452279"/>
+            <a:ext cx="877080" cy="300148"/>
+          </a:xfrm>
+          <a:prstGeom prst="rect">
+            <a:avLst/>
+          </a:prstGeom>
+          <a:ln w="38100">
+            <a:solidFill>
+              <a:srgbClr val="FFC000"/>
+            </a:solidFill>
+          </a:ln>
+        </p:spPr>
+        <p:style>
+          <a:lnRef idx="2">
+            <a:schemeClr val="accent6"/>
+          </a:lnRef>
+          <a:fillRef idx="1">
+            <a:schemeClr val="lt1"/>
+          </a:fillRef>
+          <a:effectRef idx="0">
+            <a:schemeClr val="accent6"/>
+          </a:effectRef>
+          <a:fontRef idx="minor">
+            <a:schemeClr val="dk1"/>
+          </a:fontRef>
+        </p:style>
+        <p:txBody>
+          <a:bodyPr rtlCol="0" anchor="ctr"/>
+          <a:lstStyle/>
+          <a:p>
+            <a:pPr algn="ctr"/>
+            <a:r>
+              <a:rPr lang="en-IT" sz="1200" dirty="0">
+                <a:latin typeface="Palatino Linotype" panose="02040502050505030304" pitchFamily="18" charset="0"/>
+              </a:rPr>
+              <a:t>Lesson 9</a:t>
+            </a:r>
+          </a:p>
+        </p:txBody>
+      </p:sp>
+      <p:sp>
+        <p:nvSpPr>
+          <p:cNvPr id="43" name="Rectangle 42">
+            <a:extLst>
+              <a:ext uri="{FF2B5EF4-FFF2-40B4-BE49-F238E27FC236}">
+                <a16:creationId xmlns:a16="http://schemas.microsoft.com/office/drawing/2014/main" id="{6B269CCF-AC68-0344-836A-3DAFE5918B0A}"/>
+              </a:ext>
+            </a:extLst>
+          </p:cNvPr>
+          <p:cNvSpPr/>
+          <p:nvPr/>
+        </p:nvSpPr>
+        <p:spPr>
+          <a:xfrm>
+            <a:off x="9303992" y="1187877"/>
+            <a:ext cx="877080" cy="300148"/>
+          </a:xfrm>
+          <a:prstGeom prst="rect">
+            <a:avLst/>
+          </a:prstGeom>
+          <a:ln w="38100">
+            <a:solidFill>
+              <a:srgbClr val="7030A0"/>
+            </a:solidFill>
+          </a:ln>
+        </p:spPr>
+        <p:style>
+          <a:lnRef idx="2">
+            <a:schemeClr val="accent6"/>
+          </a:lnRef>
+          <a:fillRef idx="1">
+            <a:schemeClr val="lt1"/>
+          </a:fillRef>
+          <a:effectRef idx="0">
+            <a:schemeClr val="accent6"/>
+          </a:effectRef>
+          <a:fontRef idx="minor">
+            <a:schemeClr val="dk1"/>
+          </a:fontRef>
+        </p:style>
+        <p:txBody>
+          <a:bodyPr rtlCol="0" anchor="ctr"/>
+          <a:lstStyle/>
+          <a:p>
+            <a:pPr algn="ctr"/>
+            <a:r>
+              <a:rPr lang="en-IT" sz="1200" dirty="0">
+                <a:latin typeface="Palatino Linotype" panose="02040502050505030304" pitchFamily="18" charset="0"/>
+              </a:rPr>
+              <a:t>Lesson 10</a:t>
+            </a:r>
+          </a:p>
+        </p:txBody>
+      </p:sp>
+      <p:sp>
+        <p:nvSpPr>
+          <p:cNvPr id="44" name="Rectangle 43">
+            <a:extLst>
+              <a:ext uri="{FF2B5EF4-FFF2-40B4-BE49-F238E27FC236}">
+                <a16:creationId xmlns:a16="http://schemas.microsoft.com/office/drawing/2014/main" id="{7956A9EB-7793-084B-9B37-521829AD396E}"/>
+              </a:ext>
+            </a:extLst>
+          </p:cNvPr>
+          <p:cNvSpPr/>
+          <p:nvPr/>
+        </p:nvSpPr>
+        <p:spPr>
+          <a:xfrm>
+            <a:off x="9305076" y="2436008"/>
+            <a:ext cx="877080" cy="300148"/>
+          </a:xfrm>
+          <a:prstGeom prst="rect">
+            <a:avLst/>
+          </a:prstGeom>
+          <a:ln w="38100">
+            <a:solidFill>
+              <a:srgbClr val="7030A0"/>
+            </a:solidFill>
+          </a:ln>
+        </p:spPr>
+        <p:style>
+          <a:lnRef idx="2">
+            <a:schemeClr val="accent6"/>
+          </a:lnRef>
+          <a:fillRef idx="1">
+            <a:schemeClr val="lt1"/>
+          </a:fillRef>
+          <a:effectRef idx="0">
+            <a:schemeClr val="accent6"/>
+          </a:effectRef>
+          <a:fontRef idx="minor">
+            <a:schemeClr val="dk1"/>
+          </a:fontRef>
+        </p:style>
+        <p:txBody>
+          <a:bodyPr rtlCol="0" anchor="ctr"/>
+          <a:lstStyle/>
+          <a:p>
+            <a:pPr algn="ctr"/>
+            <a:r>
+              <a:rPr lang="en-IT" sz="1200" dirty="0">
+                <a:latin typeface="Palatino Linotype" panose="02040502050505030304" pitchFamily="18" charset="0"/>
+              </a:rPr>
+              <a:t>Lesson 11</a:t>
+            </a:r>
+          </a:p>
+        </p:txBody>
+      </p:sp>
+      <p:cxnSp>
+        <p:nvCxnSpPr>
+          <p:cNvPr id="45" name="Straight Connector 44">
+            <a:extLst>
+              <a:ext uri="{FF2B5EF4-FFF2-40B4-BE49-F238E27FC236}">
+                <a16:creationId xmlns:a16="http://schemas.microsoft.com/office/drawing/2014/main" id="{486C75B7-9B5F-B74C-BE7F-35C0CDFB1817}"/>
+              </a:ext>
+            </a:extLst>
+          </p:cNvPr>
+          <p:cNvCxnSpPr>
+            <a:cxnSpLocks/>
+          </p:cNvCxnSpPr>
+          <p:nvPr/>
+        </p:nvCxnSpPr>
+        <p:spPr>
+          <a:xfrm>
+            <a:off x="9056914" y="1231320"/>
+            <a:ext cx="0" cy="4102679"/>
+          </a:xfrm>
+          <a:prstGeom prst="line">
+            <a:avLst/>
+          </a:prstGeom>
+          <a:ln w="38100">
+            <a:solidFill>
+              <a:srgbClr val="FFC000"/>
+            </a:solidFill>
+          </a:ln>
+        </p:spPr>
+        <p:style>
+          <a:lnRef idx="1">
+            <a:schemeClr val="accent6"/>
+          </a:lnRef>
+          <a:fillRef idx="0">
+            <a:schemeClr val="accent6"/>
+          </a:fillRef>
+          <a:effectRef idx="0">
+            <a:schemeClr val="accent6"/>
+          </a:effectRef>
+          <a:fontRef idx="minor">
+            <a:schemeClr val="tx1"/>
+          </a:fontRef>
+        </p:style>
+      </p:cxnSp>
+      <p:cxnSp>
+        <p:nvCxnSpPr>
+          <p:cNvPr id="46" name="Straight Connector 45">
+            <a:extLst>
+              <a:ext uri="{FF2B5EF4-FFF2-40B4-BE49-F238E27FC236}">
+                <a16:creationId xmlns:a16="http://schemas.microsoft.com/office/drawing/2014/main" id="{7DF77F43-12C7-A14C-810A-67101A243979}"/>
+              </a:ext>
+            </a:extLst>
+          </p:cNvPr>
+          <p:cNvCxnSpPr>
+            <a:cxnSpLocks/>
+          </p:cNvCxnSpPr>
+          <p:nvPr/>
+        </p:nvCxnSpPr>
+        <p:spPr>
+          <a:xfrm>
+            <a:off x="6052457" y="1231320"/>
+            <a:ext cx="0" cy="4102679"/>
+          </a:xfrm>
+          <a:prstGeom prst="line">
+            <a:avLst/>
+          </a:prstGeom>
+          <a:ln w="38100">
+            <a:solidFill>
+              <a:schemeClr val="accent1"/>
+            </a:solidFill>
+          </a:ln>
+        </p:spPr>
+        <p:style>
+          <a:lnRef idx="1">
+            <a:schemeClr val="accent6"/>
+          </a:lnRef>
+          <a:fillRef idx="0">
+            <a:schemeClr val="accent6"/>
+          </a:fillRef>
+          <a:effectRef idx="0">
+            <a:schemeClr val="accent6"/>
+          </a:effectRef>
+          <a:fontRef idx="minor">
+            <a:schemeClr val="tx1"/>
+          </a:fontRef>
+        </p:style>
+      </p:cxnSp>
+      <p:sp>
+        <p:nvSpPr>
+          <p:cNvPr id="47" name="Rectangle 46">
+            <a:extLst>
+              <a:ext uri="{FF2B5EF4-FFF2-40B4-BE49-F238E27FC236}">
+                <a16:creationId xmlns:a16="http://schemas.microsoft.com/office/drawing/2014/main" id="{298133C5-2A16-344D-B5D1-EC7DFAA4BD42}"/>
+              </a:ext>
+            </a:extLst>
+          </p:cNvPr>
+          <p:cNvSpPr/>
+          <p:nvPr/>
+        </p:nvSpPr>
+        <p:spPr>
+          <a:xfrm>
+            <a:off x="9295165" y="4007242"/>
+            <a:ext cx="2571750" cy="860243"/>
+          </a:xfrm>
+          <a:prstGeom prst="rect">
+            <a:avLst/>
+          </a:prstGeom>
+          <a:ln w="38100">
+            <a:solidFill>
+              <a:srgbClr val="7030A0"/>
+            </a:solidFill>
+          </a:ln>
+        </p:spPr>
+        <p:style>
+          <a:lnRef idx="2">
+            <a:schemeClr val="accent6"/>
+          </a:lnRef>
+          <a:fillRef idx="1">
+            <a:schemeClr val="lt1"/>
+          </a:fillRef>
+          <a:effectRef idx="0">
+            <a:schemeClr val="accent6"/>
+          </a:effectRef>
+          <a:fontRef idx="minor">
+            <a:schemeClr val="dk1"/>
+          </a:fontRef>
+        </p:style>
+        <p:txBody>
+          <a:bodyPr rtlCol="0" anchor="ctr"/>
+          <a:lstStyle/>
+          <a:p>
+            <a:pPr algn="ctr"/>
             <a:r>
               <a:rPr lang="en-IT" dirty="0">
-                <a:solidFill>
-                  <a:schemeClr val="bg1">
-                    <a:lumMod val="75000"/>
-                  </a:schemeClr>
-                </a:solidFill>
-              </a:rPr>
-              <a:t>Classes</a:t>
-            </a:r>
-          </a:p>
-          <a:p>
-            <a:r>
-              <a:rPr lang="en-IT" dirty="0">
-                <a:solidFill>
-                  <a:schemeClr val="bg1">
-                    <a:lumMod val="75000"/>
-                  </a:schemeClr>
-                </a:solidFill>
-              </a:rPr>
-              <a:t>Inheritance</a:t>
-            </a:r>
-          </a:p>
-          <a:p>
-            <a:r>
-              <a:rPr lang="en-IT" dirty="0">
-                <a:solidFill>
-                  <a:schemeClr val="bg1">
-                    <a:lumMod val="75000"/>
-                  </a:schemeClr>
-                </a:solidFill>
-              </a:rPr>
-              <a:t>Other things</a:t>
-            </a:r>
-          </a:p>
-          <a:p>
-            <a:r>
-              <a:rPr lang="en-IT" dirty="0">
-                <a:solidFill>
-                  <a:schemeClr val="bg1">
-                    <a:lumMod val="75000"/>
-                  </a:schemeClr>
-                </a:solidFill>
-              </a:rPr>
-              <a:t>Asynchrony</a:t>
-            </a:r>
-          </a:p>
-          <a:p>
-            <a:endParaRPr lang="en-IT" dirty="0">
-              <a:solidFill>
-                <a:schemeClr val="bg1">
-                  <a:lumMod val="75000"/>
-                </a:schemeClr>
-              </a:solidFill>
-            </a:endParaRPr>
-          </a:p>
-          <a:p>
-            <a:r>
-              <a:rPr lang="en-IT" dirty="0">
-                <a:solidFill>
-                  <a:schemeClr val="bg1">
-                    <a:lumMod val="75000"/>
-                  </a:schemeClr>
-                </a:solidFill>
-              </a:rPr>
-              <a:t>Exercises</a:t>
-            </a:r>
-          </a:p>
-          <a:p>
-            <a:r>
-              <a:rPr lang="en-IT" dirty="0">
-                <a:solidFill>
-                  <a:schemeClr val="bg1">
-                    <a:lumMod val="75000"/>
-                  </a:schemeClr>
-                </a:solidFill>
-              </a:rPr>
-              <a:t>Homework</a:t>
-            </a:r>
-          </a:p>
-          <a:p>
-            <a:r>
-              <a:rPr lang="en-IT" dirty="0">
-                <a:solidFill>
-                  <a:schemeClr val="bg1">
-                    <a:lumMod val="75000"/>
-                  </a:schemeClr>
-                </a:solidFill>
-              </a:rPr>
-              <a:t>Resources</a:t>
+                <a:latin typeface="Palatino Linotype" panose="02040502050505030304" pitchFamily="18" charset="0"/>
+              </a:rPr>
+              <a:t>Advanced stuff</a:t>
             </a:r>
           </a:p>
         </p:txBody>
       </p:sp>
+      <p:sp>
+        <p:nvSpPr>
+          <p:cNvPr id="48" name="Rectangle 47">
+            <a:extLst>
+              <a:ext uri="{FF2B5EF4-FFF2-40B4-BE49-F238E27FC236}">
+                <a16:creationId xmlns:a16="http://schemas.microsoft.com/office/drawing/2014/main" id="{1BEB5484-6620-3542-B689-4B959C0B7DF8}"/>
+              </a:ext>
+            </a:extLst>
+          </p:cNvPr>
+          <p:cNvSpPr/>
+          <p:nvPr/>
+        </p:nvSpPr>
+        <p:spPr>
+          <a:xfrm>
+            <a:off x="9296249" y="3690823"/>
+            <a:ext cx="877080" cy="300148"/>
+          </a:xfrm>
+          <a:prstGeom prst="rect">
+            <a:avLst/>
+          </a:prstGeom>
+          <a:ln w="38100">
+            <a:solidFill>
+              <a:srgbClr val="7030A0"/>
+            </a:solidFill>
+          </a:ln>
+        </p:spPr>
+        <p:style>
+          <a:lnRef idx="2">
+            <a:schemeClr val="accent6"/>
+          </a:lnRef>
+          <a:fillRef idx="1">
+            <a:schemeClr val="lt1"/>
+          </a:fillRef>
+          <a:effectRef idx="0">
+            <a:schemeClr val="accent6"/>
+          </a:effectRef>
+          <a:fontRef idx="minor">
+            <a:schemeClr val="dk1"/>
+          </a:fontRef>
+        </p:style>
+        <p:txBody>
+          <a:bodyPr rtlCol="0" anchor="ctr"/>
+          <a:lstStyle/>
+          <a:p>
+            <a:pPr algn="ctr"/>
+            <a:r>
+              <a:rPr lang="en-IT" sz="1200" dirty="0">
+                <a:latin typeface="Palatino Linotype" panose="02040502050505030304" pitchFamily="18" charset="0"/>
+              </a:rPr>
+              <a:t>Lesson 12</a:t>
+            </a:r>
+          </a:p>
+        </p:txBody>
+      </p:sp>
+      <p:pic>
+        <p:nvPicPr>
+          <p:cNvPr id="4" name="Graphic 3" descr="Tick with solid fill">
+            <a:extLst>
+              <a:ext uri="{FF2B5EF4-FFF2-40B4-BE49-F238E27FC236}">
+                <a16:creationId xmlns:a16="http://schemas.microsoft.com/office/drawing/2014/main" id="{A2607237-7AC3-924E-A8DE-9B2626683324}"/>
+              </a:ext>
+            </a:extLst>
+          </p:cNvPr>
+          <p:cNvPicPr>
+            <a:picLocks noChangeAspect="1"/>
+          </p:cNvPicPr>
+          <p:nvPr/>
+        </p:nvPicPr>
+        <p:blipFill>
+          <a:blip r:embed="rId3">
+            <a:extLst>
+              <a:ext uri="{28A0092B-C50C-407E-A947-70E740481C1C}">
+                <a14:useLocalDpi xmlns:a14="http://schemas.microsoft.com/office/drawing/2010/main" val="0"/>
+              </a:ext>
+              <a:ext uri="{96DAC541-7B7A-43D3-8B79-37D633B846F1}">
+                <asvg:svgBlip xmlns:asvg="http://schemas.microsoft.com/office/drawing/2016/SVG/main" r:embed="rId4"/>
+              </a:ext>
+            </a:extLst>
+          </a:blip>
+          <a:stretch>
+            <a:fillRect/>
+          </a:stretch>
+        </p:blipFill>
+        <p:spPr>
+          <a:xfrm>
+            <a:off x="2581591" y="1231135"/>
+            <a:ext cx="509952" cy="509952"/>
+          </a:xfrm>
+          <a:prstGeom prst="rect">
+            <a:avLst/>
+          </a:prstGeom>
+        </p:spPr>
+      </p:pic>
     </p:spTree>
     <p:extLst>
       <p:ext uri="{BB962C8B-B14F-4D97-AF65-F5344CB8AC3E}">
-        <p14:creationId xmlns:p14="http://schemas.microsoft.com/office/powerpoint/2010/main" val="357888541"/>
+        <p14:creationId xmlns:p14="http://schemas.microsoft.com/office/powerpoint/2010/main" val="2792479671"/>
       </p:ext>
     </p:extLst>
   </p:cSld>

</xml_diff>

<commit_message>
[ay-2022-23] ay-2021-22 ended. Merging.
</commit_message>
<xml_diff>
--- a/lab_03-dart_101_part_2/lab_03-dart_101_part_2.pptx
+++ b/lab_03-dart_101_part_2/lab_03-dart_101_part_2.pptx
@@ -233,7 +233,7 @@
           <a:p>
             <a:fld id="{81C4B3FE-0320-8142-8396-5C3025C019EC}" type="datetimeFigureOut">
               <a:rPr lang="en-IT" smtClean="0"/>
-              <a:t>15/03/22</a:t>
+              <a:t>15/11/22</a:t>
             </a:fld>
             <a:endParaRPr lang="en-IT"/>
           </a:p>
@@ -22440,7 +22440,7 @@
 </file>
 
 <file path=ppt/slides/slide6.xml><?xml version="1.0" encoding="utf-8"?>
-<p:sld xmlns:a="http://schemas.openxmlformats.org/drawingml/2006/main" xmlns:r="http://schemas.openxmlformats.org/officeDocument/2006/relationships" xmlns:p="http://schemas.openxmlformats.org/presentationml/2006/main">
+<p:sld xmlns:a="http://schemas.openxmlformats.org/drawingml/2006/main" xmlns:r="http://schemas.openxmlformats.org/officeDocument/2006/relationships" xmlns:p="http://schemas.openxmlformats.org/presentationml/2006/main" show="0">
   <p:cSld>
     <p:spTree>
       <p:nvGrpSpPr>

</xml_diff>

<commit_message>
[master] added zip file
</commit_message>
<xml_diff>
--- a/lab_03-dart_101_part_2/lab_03-dart_101_part_2.pptx
+++ b/lab_03-dart_101_part_2/lab_03-dart_101_part_2.pptx
@@ -263,7 +263,7 @@
           <a:p>
             <a:fld id="{81C4B3FE-0320-8142-8396-5C3025C019EC}" type="datetimeFigureOut">
               <a:rPr lang="en-IT" smtClean="0"/>
-              <a:t>1/30/24</a:t>
+              <a:t>3/12/24</a:t>
             </a:fld>
             <a:endParaRPr lang="en-IT"/>
           </a:p>
@@ -32278,7 +32278,23 @@
             </a:r>
             <a:r>
               <a:rPr lang="en-IT" dirty="0"/>
-              <a:t> the operation are performed.</a:t>
+              <a:t> the </a:t>
+            </a:r>
+            <a:r>
+              <a:rPr lang="en-IT"/>
+              <a:t>operation </a:t>
+            </a:r>
+            <a:r>
+              <a:rPr lang="en-US" dirty="0"/>
+              <a:t>is</a:t>
+            </a:r>
+            <a:r>
+              <a:rPr lang="en-IT"/>
+              <a:t> </a:t>
+            </a:r>
+            <a:r>
+              <a:rPr lang="en-IT" dirty="0"/>
+              <a:t>performed.</a:t>
             </a:r>
           </a:p>
           <a:p>
@@ -34094,7 +34110,7 @@
           <a:p>
             <a:r>
               <a:rPr lang="en-US" b="1" dirty="0"/>
-              <a:t>In Dart, interfaces are defined via abstract classes only</a:t>
+              <a:t>In Dart, ADTs are defined via abstract classes only</a:t>
             </a:r>
             <a:r>
               <a:rPr lang="en-US" dirty="0"/>

</xml_diff>